<commit_message>
Modifications in the results section and its plots
</commit_message>
<xml_diff>
--- a/Manuscript/Figures/Diurnal_Cycle.pptx
+++ b/Manuscript/Figures/Diurnal_Cycle.pptx
@@ -2,12 +2,12 @@
 <file path=ppt/presentation.xml><?xml version="1.0" encoding="utf-8"?>
 <p:presentation xmlns:a="http://schemas.openxmlformats.org/drawingml/2006/main" xmlns:r="http://schemas.openxmlformats.org/officeDocument/2006/relationships" xmlns:p="http://schemas.openxmlformats.org/presentationml/2006/main" saveSubsetFonts="1">
   <p:sldMasterIdLst>
-    <p:sldMasterId id="2147483696" r:id="rId1"/>
+    <p:sldMasterId id="2147483708" r:id="rId1"/>
   </p:sldMasterIdLst>
   <p:sldIdLst>
     <p:sldId id="256" r:id="rId2"/>
   </p:sldIdLst>
-  <p:sldSz cx="3186113" cy="3779838"/>
+  <p:sldSz cx="3186113" cy="3527425"/>
   <p:notesSz cx="6858000" cy="9144000"/>
   <p:defaultTextStyle>
     <a:defPPr>
@@ -874,8 +874,8 @@
         </p:nvSpPr>
         <p:spPr>
           <a:xfrm>
-            <a:off x="238959" y="618599"/>
-            <a:ext cx="2708196" cy="1315944"/>
+            <a:off x="238959" y="577290"/>
+            <a:ext cx="2708196" cy="1228066"/>
           </a:xfrm>
         </p:spPr>
         <p:txBody>
@@ -906,8 +906,8 @@
         </p:nvSpPr>
         <p:spPr>
           <a:xfrm>
-            <a:off x="398264" y="1985290"/>
-            <a:ext cx="2389585" cy="912586"/>
+            <a:off x="398264" y="1852715"/>
+            <a:ext cx="2389585" cy="851644"/>
           </a:xfrm>
         </p:spPr>
         <p:txBody>
@@ -976,7 +976,7 @@
           <a:p>
             <a:fld id="{7FE43369-170B-4886-A028-E14877BC39B1}" type="datetimeFigureOut">
               <a:rPr lang="en-GB" smtClean="0"/>
-              <a:t>27/01/2022</a:t>
+              <a:t>02/02/2022</a:t>
             </a:fld>
             <a:endParaRPr lang="en-GB"/>
           </a:p>
@@ -1027,7 +1027,7 @@
     </p:spTree>
     <p:extLst>
       <p:ext uri="{BB962C8B-B14F-4D97-AF65-F5344CB8AC3E}">
-        <p14:creationId xmlns:p14="http://schemas.microsoft.com/office/powerpoint/2010/main" val="1425048527"/>
+        <p14:creationId xmlns:p14="http://schemas.microsoft.com/office/powerpoint/2010/main" val="1858961575"/>
       </p:ext>
     </p:extLst>
   </p:cSld>
@@ -1146,7 +1146,7 @@
           <a:p>
             <a:fld id="{7FE43369-170B-4886-A028-E14877BC39B1}" type="datetimeFigureOut">
               <a:rPr lang="en-GB" smtClean="0"/>
-              <a:t>27/01/2022</a:t>
+              <a:t>02/02/2022</a:t>
             </a:fld>
             <a:endParaRPr lang="en-GB"/>
           </a:p>
@@ -1197,7 +1197,7 @@
     </p:spTree>
     <p:extLst>
       <p:ext uri="{BB962C8B-B14F-4D97-AF65-F5344CB8AC3E}">
-        <p14:creationId xmlns:p14="http://schemas.microsoft.com/office/powerpoint/2010/main" val="3230886059"/>
+        <p14:creationId xmlns:p14="http://schemas.microsoft.com/office/powerpoint/2010/main" val="1628916205"/>
       </p:ext>
     </p:extLst>
   </p:cSld>
@@ -1236,8 +1236,8 @@
         </p:nvSpPr>
         <p:spPr>
           <a:xfrm>
-            <a:off x="2280062" y="201241"/>
-            <a:ext cx="687006" cy="3203238"/>
+            <a:off x="2280062" y="187803"/>
+            <a:ext cx="687006" cy="2989330"/>
           </a:xfrm>
         </p:spPr>
         <p:txBody>
@@ -1264,8 +1264,8 @@
         </p:nvSpPr>
         <p:spPr>
           <a:xfrm>
-            <a:off x="219046" y="201241"/>
-            <a:ext cx="2021190" cy="3203238"/>
+            <a:off x="219046" y="187803"/>
+            <a:ext cx="2021190" cy="2989330"/>
           </a:xfrm>
         </p:spPr>
         <p:txBody>
@@ -1326,7 +1326,7 @@
           <a:p>
             <a:fld id="{7FE43369-170B-4886-A028-E14877BC39B1}" type="datetimeFigureOut">
               <a:rPr lang="en-GB" smtClean="0"/>
-              <a:t>27/01/2022</a:t>
+              <a:t>02/02/2022</a:t>
             </a:fld>
             <a:endParaRPr lang="en-GB"/>
           </a:p>
@@ -1377,7 +1377,7 @@
     </p:spTree>
     <p:extLst>
       <p:ext uri="{BB962C8B-B14F-4D97-AF65-F5344CB8AC3E}">
-        <p14:creationId xmlns:p14="http://schemas.microsoft.com/office/powerpoint/2010/main" val="2530019147"/>
+        <p14:creationId xmlns:p14="http://schemas.microsoft.com/office/powerpoint/2010/main" val="167788663"/>
       </p:ext>
     </p:extLst>
   </p:cSld>
@@ -1496,7 +1496,7 @@
           <a:p>
             <a:fld id="{7FE43369-170B-4886-A028-E14877BC39B1}" type="datetimeFigureOut">
               <a:rPr lang="en-GB" smtClean="0"/>
-              <a:t>27/01/2022</a:t>
+              <a:t>02/02/2022</a:t>
             </a:fld>
             <a:endParaRPr lang="en-GB"/>
           </a:p>
@@ -1547,7 +1547,7 @@
     </p:spTree>
     <p:extLst>
       <p:ext uri="{BB962C8B-B14F-4D97-AF65-F5344CB8AC3E}">
-        <p14:creationId xmlns:p14="http://schemas.microsoft.com/office/powerpoint/2010/main" val="52449587"/>
+        <p14:creationId xmlns:p14="http://schemas.microsoft.com/office/powerpoint/2010/main" val="3112135178"/>
       </p:ext>
     </p:extLst>
   </p:cSld>
@@ -1586,8 +1586,8 @@
         </p:nvSpPr>
         <p:spPr>
           <a:xfrm>
-            <a:off x="217386" y="942336"/>
-            <a:ext cx="2748022" cy="1572307"/>
+            <a:off x="217386" y="879407"/>
+            <a:ext cx="2748022" cy="1467311"/>
           </a:xfrm>
         </p:spPr>
         <p:txBody>
@@ -1618,8 +1618,8 @@
         </p:nvSpPr>
         <p:spPr>
           <a:xfrm>
-            <a:off x="217386" y="2529518"/>
-            <a:ext cx="2748022" cy="826839"/>
+            <a:off x="217386" y="2360600"/>
+            <a:ext cx="2748022" cy="771624"/>
           </a:xfrm>
         </p:spPr>
         <p:txBody>
@@ -1740,7 +1740,7 @@
           <a:p>
             <a:fld id="{7FE43369-170B-4886-A028-E14877BC39B1}" type="datetimeFigureOut">
               <a:rPr lang="en-GB" smtClean="0"/>
-              <a:t>27/01/2022</a:t>
+              <a:t>02/02/2022</a:t>
             </a:fld>
             <a:endParaRPr lang="en-GB"/>
           </a:p>
@@ -1791,7 +1791,7 @@
     </p:spTree>
     <p:extLst>
       <p:ext uri="{BB962C8B-B14F-4D97-AF65-F5344CB8AC3E}">
-        <p14:creationId xmlns:p14="http://schemas.microsoft.com/office/powerpoint/2010/main" val="4195110612"/>
+        <p14:creationId xmlns:p14="http://schemas.microsoft.com/office/powerpoint/2010/main" val="1331049551"/>
       </p:ext>
     </p:extLst>
   </p:cSld>
@@ -1853,8 +1853,8 @@
         </p:nvSpPr>
         <p:spPr>
           <a:xfrm>
-            <a:off x="219045" y="1006207"/>
-            <a:ext cx="1354098" cy="2398272"/>
+            <a:off x="219045" y="939013"/>
+            <a:ext cx="1354098" cy="2238119"/>
           </a:xfrm>
         </p:spPr>
         <p:txBody>
@@ -1910,8 +1910,8 @@
         </p:nvSpPr>
         <p:spPr>
           <a:xfrm>
-            <a:off x="1612970" y="1006207"/>
-            <a:ext cx="1354098" cy="2398272"/>
+            <a:off x="1612970" y="939013"/>
+            <a:ext cx="1354098" cy="2238119"/>
           </a:xfrm>
         </p:spPr>
         <p:txBody>
@@ -1972,7 +1972,7 @@
           <a:p>
             <a:fld id="{7FE43369-170B-4886-A028-E14877BC39B1}" type="datetimeFigureOut">
               <a:rPr lang="en-GB" smtClean="0"/>
-              <a:t>27/01/2022</a:t>
+              <a:t>02/02/2022</a:t>
             </a:fld>
             <a:endParaRPr lang="en-GB"/>
           </a:p>
@@ -2023,7 +2023,7 @@
     </p:spTree>
     <p:extLst>
       <p:ext uri="{BB962C8B-B14F-4D97-AF65-F5344CB8AC3E}">
-        <p14:creationId xmlns:p14="http://schemas.microsoft.com/office/powerpoint/2010/main" val="4094483845"/>
+        <p14:creationId xmlns:p14="http://schemas.microsoft.com/office/powerpoint/2010/main" val="1577719429"/>
       </p:ext>
     </p:extLst>
   </p:cSld>
@@ -2062,8 +2062,8 @@
         </p:nvSpPr>
         <p:spPr>
           <a:xfrm>
-            <a:off x="219460" y="201242"/>
-            <a:ext cx="2748022" cy="730594"/>
+            <a:off x="219460" y="187803"/>
+            <a:ext cx="2748022" cy="681806"/>
           </a:xfrm>
         </p:spPr>
         <p:txBody>
@@ -2090,8 +2090,8 @@
         </p:nvSpPr>
         <p:spPr>
           <a:xfrm>
-            <a:off x="219461" y="926586"/>
-            <a:ext cx="1347875" cy="454105"/>
+            <a:off x="219461" y="864709"/>
+            <a:ext cx="1347875" cy="423781"/>
           </a:xfrm>
         </p:spPr>
         <p:txBody>
@@ -2155,8 +2155,8 @@
         </p:nvSpPr>
         <p:spPr>
           <a:xfrm>
-            <a:off x="219461" y="1380691"/>
-            <a:ext cx="1347875" cy="2030788"/>
+            <a:off x="219461" y="1288490"/>
+            <a:ext cx="1347875" cy="1895175"/>
           </a:xfrm>
         </p:spPr>
         <p:txBody>
@@ -2212,8 +2212,8 @@
         </p:nvSpPr>
         <p:spPr>
           <a:xfrm>
-            <a:off x="1612970" y="926586"/>
-            <a:ext cx="1354513" cy="454105"/>
+            <a:off x="1612970" y="864709"/>
+            <a:ext cx="1354513" cy="423781"/>
           </a:xfrm>
         </p:spPr>
         <p:txBody>
@@ -2277,8 +2277,8 @@
         </p:nvSpPr>
         <p:spPr>
           <a:xfrm>
-            <a:off x="1612970" y="1380691"/>
-            <a:ext cx="1354513" cy="2030788"/>
+            <a:off x="1612970" y="1288490"/>
+            <a:ext cx="1354513" cy="1895175"/>
           </a:xfrm>
         </p:spPr>
         <p:txBody>
@@ -2339,7 +2339,7 @@
           <a:p>
             <a:fld id="{7FE43369-170B-4886-A028-E14877BC39B1}" type="datetimeFigureOut">
               <a:rPr lang="en-GB" smtClean="0"/>
-              <a:t>27/01/2022</a:t>
+              <a:t>02/02/2022</a:t>
             </a:fld>
             <a:endParaRPr lang="en-GB"/>
           </a:p>
@@ -2390,7 +2390,7 @@
     </p:spTree>
     <p:extLst>
       <p:ext uri="{BB962C8B-B14F-4D97-AF65-F5344CB8AC3E}">
-        <p14:creationId xmlns:p14="http://schemas.microsoft.com/office/powerpoint/2010/main" val="3012432205"/>
+        <p14:creationId xmlns:p14="http://schemas.microsoft.com/office/powerpoint/2010/main" val="2117584256"/>
       </p:ext>
     </p:extLst>
   </p:cSld>
@@ -2457,7 +2457,7 @@
           <a:p>
             <a:fld id="{7FE43369-170B-4886-A028-E14877BC39B1}" type="datetimeFigureOut">
               <a:rPr lang="en-GB" smtClean="0"/>
-              <a:t>27/01/2022</a:t>
+              <a:t>02/02/2022</a:t>
             </a:fld>
             <a:endParaRPr lang="en-GB"/>
           </a:p>
@@ -2508,7 +2508,7 @@
     </p:spTree>
     <p:extLst>
       <p:ext uri="{BB962C8B-B14F-4D97-AF65-F5344CB8AC3E}">
-        <p14:creationId xmlns:p14="http://schemas.microsoft.com/office/powerpoint/2010/main" val="3156360175"/>
+        <p14:creationId xmlns:p14="http://schemas.microsoft.com/office/powerpoint/2010/main" val="453441150"/>
       </p:ext>
     </p:extLst>
   </p:cSld>
@@ -2552,7 +2552,7 @@
           <a:p>
             <a:fld id="{7FE43369-170B-4886-A028-E14877BC39B1}" type="datetimeFigureOut">
               <a:rPr lang="en-GB" smtClean="0"/>
-              <a:t>27/01/2022</a:t>
+              <a:t>02/02/2022</a:t>
             </a:fld>
             <a:endParaRPr lang="en-GB"/>
           </a:p>
@@ -2603,7 +2603,7 @@
     </p:spTree>
     <p:extLst>
       <p:ext uri="{BB962C8B-B14F-4D97-AF65-F5344CB8AC3E}">
-        <p14:creationId xmlns:p14="http://schemas.microsoft.com/office/powerpoint/2010/main" val="2002714240"/>
+        <p14:creationId xmlns:p14="http://schemas.microsoft.com/office/powerpoint/2010/main" val="2423247259"/>
       </p:ext>
     </p:extLst>
   </p:cSld>
@@ -2642,8 +2642,8 @@
         </p:nvSpPr>
         <p:spPr>
           <a:xfrm>
-            <a:off x="219460" y="251989"/>
-            <a:ext cx="1027604" cy="881962"/>
+            <a:off x="219460" y="235162"/>
+            <a:ext cx="1027604" cy="823066"/>
           </a:xfrm>
         </p:spPr>
         <p:txBody>
@@ -2674,8 +2674,8 @@
         </p:nvSpPr>
         <p:spPr>
           <a:xfrm>
-            <a:off x="1354513" y="544227"/>
-            <a:ext cx="1612970" cy="2686135"/>
+            <a:off x="1354513" y="507885"/>
+            <a:ext cx="1612970" cy="2506758"/>
           </a:xfrm>
         </p:spPr>
         <p:txBody>
@@ -2759,8 +2759,8 @@
         </p:nvSpPr>
         <p:spPr>
           <a:xfrm>
-            <a:off x="219460" y="1133952"/>
-            <a:ext cx="1027604" cy="2100785"/>
+            <a:off x="219460" y="1058228"/>
+            <a:ext cx="1027604" cy="1960497"/>
           </a:xfrm>
         </p:spPr>
         <p:txBody>
@@ -2829,7 +2829,7 @@
           <a:p>
             <a:fld id="{7FE43369-170B-4886-A028-E14877BC39B1}" type="datetimeFigureOut">
               <a:rPr lang="en-GB" smtClean="0"/>
-              <a:t>27/01/2022</a:t>
+              <a:t>02/02/2022</a:t>
             </a:fld>
             <a:endParaRPr lang="en-GB"/>
           </a:p>
@@ -2880,7 +2880,7 @@
     </p:spTree>
     <p:extLst>
       <p:ext uri="{BB962C8B-B14F-4D97-AF65-F5344CB8AC3E}">
-        <p14:creationId xmlns:p14="http://schemas.microsoft.com/office/powerpoint/2010/main" val="398226168"/>
+        <p14:creationId xmlns:p14="http://schemas.microsoft.com/office/powerpoint/2010/main" val="3113359507"/>
       </p:ext>
     </p:extLst>
   </p:cSld>
@@ -2919,8 +2919,8 @@
         </p:nvSpPr>
         <p:spPr>
           <a:xfrm>
-            <a:off x="219460" y="251989"/>
-            <a:ext cx="1027604" cy="881962"/>
+            <a:off x="219460" y="235162"/>
+            <a:ext cx="1027604" cy="823066"/>
           </a:xfrm>
         </p:spPr>
         <p:txBody>
@@ -2951,8 +2951,8 @@
         </p:nvSpPr>
         <p:spPr>
           <a:xfrm>
-            <a:off x="1354513" y="544227"/>
-            <a:ext cx="1612970" cy="2686135"/>
+            <a:off x="1354513" y="507885"/>
+            <a:ext cx="1612970" cy="2506758"/>
           </a:xfrm>
         </p:spPr>
         <p:txBody>
@@ -3016,8 +3016,8 @@
         </p:nvSpPr>
         <p:spPr>
           <a:xfrm>
-            <a:off x="219460" y="1133952"/>
-            <a:ext cx="1027604" cy="2100785"/>
+            <a:off x="219460" y="1058228"/>
+            <a:ext cx="1027604" cy="1960497"/>
           </a:xfrm>
         </p:spPr>
         <p:txBody>
@@ -3086,7 +3086,7 @@
           <a:p>
             <a:fld id="{7FE43369-170B-4886-A028-E14877BC39B1}" type="datetimeFigureOut">
               <a:rPr lang="en-GB" smtClean="0"/>
-              <a:t>27/01/2022</a:t>
+              <a:t>02/02/2022</a:t>
             </a:fld>
             <a:endParaRPr lang="en-GB"/>
           </a:p>
@@ -3137,7 +3137,7 @@
     </p:spTree>
     <p:extLst>
       <p:ext uri="{BB962C8B-B14F-4D97-AF65-F5344CB8AC3E}">
-        <p14:creationId xmlns:p14="http://schemas.microsoft.com/office/powerpoint/2010/main" val="3736808771"/>
+        <p14:creationId xmlns:p14="http://schemas.microsoft.com/office/powerpoint/2010/main" val="3100497986"/>
       </p:ext>
     </p:extLst>
   </p:cSld>
@@ -3181,8 +3181,8 @@
         </p:nvSpPr>
         <p:spPr>
           <a:xfrm>
-            <a:off x="219046" y="201242"/>
-            <a:ext cx="2748022" cy="730594"/>
+            <a:off x="219046" y="187803"/>
+            <a:ext cx="2748022" cy="681806"/>
           </a:xfrm>
           <a:prstGeom prst="rect">
             <a:avLst/>
@@ -3214,8 +3214,8 @@
         </p:nvSpPr>
         <p:spPr>
           <a:xfrm>
-            <a:off x="219046" y="1006207"/>
-            <a:ext cx="2748022" cy="2398272"/>
+            <a:off x="219046" y="939013"/>
+            <a:ext cx="2748022" cy="2238119"/>
           </a:xfrm>
           <a:prstGeom prst="rect">
             <a:avLst/>
@@ -3276,8 +3276,8 @@
         </p:nvSpPr>
         <p:spPr>
           <a:xfrm>
-            <a:off x="219045" y="3503351"/>
-            <a:ext cx="716875" cy="201241"/>
+            <a:off x="219045" y="3269401"/>
+            <a:ext cx="716875" cy="187803"/>
           </a:xfrm>
           <a:prstGeom prst="rect">
             <a:avLst/>
@@ -3299,7 +3299,7 @@
           <a:p>
             <a:fld id="{7FE43369-170B-4886-A028-E14877BC39B1}" type="datetimeFigureOut">
               <a:rPr lang="en-GB" smtClean="0"/>
-              <a:t>27/01/2022</a:t>
+              <a:t>02/02/2022</a:t>
             </a:fld>
             <a:endParaRPr lang="en-GB"/>
           </a:p>
@@ -3317,8 +3317,8 @@
         </p:nvSpPr>
         <p:spPr>
           <a:xfrm>
-            <a:off x="1055400" y="3503351"/>
-            <a:ext cx="1075313" cy="201241"/>
+            <a:off x="1055400" y="3269401"/>
+            <a:ext cx="1075313" cy="187803"/>
           </a:xfrm>
           <a:prstGeom prst="rect">
             <a:avLst/>
@@ -3354,8 +3354,8 @@
         </p:nvSpPr>
         <p:spPr>
           <a:xfrm>
-            <a:off x="2250193" y="3503351"/>
-            <a:ext cx="716875" cy="201241"/>
+            <a:off x="2250193" y="3269401"/>
+            <a:ext cx="716875" cy="187803"/>
           </a:xfrm>
           <a:prstGeom prst="rect">
             <a:avLst/>
@@ -3386,23 +3386,23 @@
     </p:spTree>
     <p:extLst>
       <p:ext uri="{BB962C8B-B14F-4D97-AF65-F5344CB8AC3E}">
-        <p14:creationId xmlns:p14="http://schemas.microsoft.com/office/powerpoint/2010/main" val="2066829556"/>
+        <p14:creationId xmlns:p14="http://schemas.microsoft.com/office/powerpoint/2010/main" val="2878113303"/>
       </p:ext>
     </p:extLst>
   </p:cSld>
   <p:clrMap bg1="lt1" tx1="dk1" bg2="lt2" tx2="dk2" accent1="accent1" accent2="accent2" accent3="accent3" accent4="accent4" accent5="accent5" accent6="accent6" hlink="hlink" folHlink="folHlink"/>
   <p:sldLayoutIdLst>
-    <p:sldLayoutId id="2147483697" r:id="rId1"/>
-    <p:sldLayoutId id="2147483698" r:id="rId2"/>
-    <p:sldLayoutId id="2147483699" r:id="rId3"/>
-    <p:sldLayoutId id="2147483700" r:id="rId4"/>
-    <p:sldLayoutId id="2147483701" r:id="rId5"/>
-    <p:sldLayoutId id="2147483702" r:id="rId6"/>
-    <p:sldLayoutId id="2147483703" r:id="rId7"/>
-    <p:sldLayoutId id="2147483704" r:id="rId8"/>
-    <p:sldLayoutId id="2147483705" r:id="rId9"/>
-    <p:sldLayoutId id="2147483706" r:id="rId10"/>
-    <p:sldLayoutId id="2147483707" r:id="rId11"/>
+    <p:sldLayoutId id="2147483709" r:id="rId1"/>
+    <p:sldLayoutId id="2147483710" r:id="rId2"/>
+    <p:sldLayoutId id="2147483711" r:id="rId3"/>
+    <p:sldLayoutId id="2147483712" r:id="rId4"/>
+    <p:sldLayoutId id="2147483713" r:id="rId5"/>
+    <p:sldLayoutId id="2147483714" r:id="rId6"/>
+    <p:sldLayoutId id="2147483715" r:id="rId7"/>
+    <p:sldLayoutId id="2147483716" r:id="rId8"/>
+    <p:sldLayoutId id="2147483717" r:id="rId9"/>
+    <p:sldLayoutId id="2147483718" r:id="rId10"/>
+    <p:sldLayoutId id="2147483719" r:id="rId11"/>
   </p:sldLayoutIdLst>
   <p:txStyles>
     <p:titleStyle>
@@ -3706,10 +3706,10 @@
       </p:grpSpPr>
       <p:sp>
         <p:nvSpPr>
-          <p:cNvPr id="72" name="TextBox 71">
+          <p:cNvPr id="27" name="TextBox 26">
             <a:extLst>
               <a:ext uri="{FF2B5EF4-FFF2-40B4-BE49-F238E27FC236}">
-                <a16:creationId xmlns:a16="http://schemas.microsoft.com/office/drawing/2014/main" id="{0A681D18-77AB-4110-976A-E1252442B605}"/>
+                <a16:creationId xmlns:a16="http://schemas.microsoft.com/office/drawing/2014/main" id="{00E90DE2-659E-4F92-9C90-618438314250}"/>
               </a:ext>
             </a:extLst>
           </p:cNvPr>
@@ -3718,7 +3718,7 @@
         </p:nvSpPr>
         <p:spPr>
           <a:xfrm rot="16200000">
-            <a:off x="-207590" y="3357770"/>
+            <a:off x="-212279" y="2926364"/>
             <a:ext cx="1131127" cy="338554"/>
           </a:xfrm>
           <a:prstGeom prst="rect">
@@ -3736,7 +3736,7 @@
             <a:r>
               <a:rPr lang="en-GB" sz="800" dirty="0">
                 <a:solidFill>
-                  <a:srgbClr val="7030A0"/>
+                  <a:srgbClr val="00B050"/>
                 </a:solidFill>
               </a:rPr>
               <a:t>0000 – 1200 UTC</a:t>
@@ -3747,22 +3747,20 @@
             <a:r>
               <a:rPr lang="en-GB" sz="800" dirty="0">
                 <a:solidFill>
-                  <a:schemeClr val="accent2">
-                    <a:lumMod val="75000"/>
-                  </a:schemeClr>
+                  <a:srgbClr val="00B050"/>
                 </a:solidFill>
               </a:rPr>
-              <a:t>1800 – 0600 LST</a:t>
-            </a:r>
-          </a:p>
-        </p:txBody>
-      </p:sp>
-      <p:sp>
-        <p:nvSpPr>
-          <p:cNvPr id="73" name="TextBox 72">
+              <a:t>(1800 – 0600 LST)</a:t>
+            </a:r>
+          </a:p>
+        </p:txBody>
+      </p:sp>
+      <p:sp>
+        <p:nvSpPr>
+          <p:cNvPr id="28" name="TextBox 27">
             <a:extLst>
               <a:ext uri="{FF2B5EF4-FFF2-40B4-BE49-F238E27FC236}">
-                <a16:creationId xmlns:a16="http://schemas.microsoft.com/office/drawing/2014/main" id="{9ACD2E4F-BB71-4C29-AB76-A35B82AEFDD4}"/>
+                <a16:creationId xmlns:a16="http://schemas.microsoft.com/office/drawing/2014/main" id="{F1F1CEF0-33DD-427A-B476-81848BB2EE82}"/>
               </a:ext>
             </a:extLst>
           </p:cNvPr>
@@ -3771,7 +3769,7 @@
         </p:nvSpPr>
         <p:spPr>
           <a:xfrm>
-            <a:off x="95250" y="2817744"/>
+            <a:off x="-456" y="3342087"/>
             <a:ext cx="3186113" cy="215444"/>
           </a:xfrm>
           <a:prstGeom prst="rect">
@@ -3795,10 +3793,10 @@
       </p:sp>
       <p:sp>
         <p:nvSpPr>
-          <p:cNvPr id="74" name="TextBox 73">
+          <p:cNvPr id="29" name="TextBox 28">
             <a:extLst>
               <a:ext uri="{FF2B5EF4-FFF2-40B4-BE49-F238E27FC236}">
-                <a16:creationId xmlns:a16="http://schemas.microsoft.com/office/drawing/2014/main" id="{5D31A063-8677-4B19-B958-A163CEABFAF7}"/>
+                <a16:creationId xmlns:a16="http://schemas.microsoft.com/office/drawing/2014/main" id="{DE58D980-EFAB-43A2-AC72-FDB72280FDEE}"/>
               </a:ext>
             </a:extLst>
           </p:cNvPr>
@@ -3831,10 +3829,10 @@
       </p:sp>
       <p:cxnSp>
         <p:nvCxnSpPr>
-          <p:cNvPr id="75" name="Straight Connector 74">
+          <p:cNvPr id="30" name="Straight Connector 29">
             <a:extLst>
               <a:ext uri="{FF2B5EF4-FFF2-40B4-BE49-F238E27FC236}">
-                <a16:creationId xmlns:a16="http://schemas.microsoft.com/office/drawing/2014/main" id="{9A56E8F5-0956-42AD-9F28-CD322FF95E73}"/>
+                <a16:creationId xmlns:a16="http://schemas.microsoft.com/office/drawing/2014/main" id="{D31BE9AF-EC05-4759-8FF8-FD7419E0A2C5}"/>
               </a:ext>
             </a:extLst>
           </p:cNvPr>
@@ -3874,10 +3872,10 @@
       </p:cxnSp>
       <p:sp>
         <p:nvSpPr>
-          <p:cNvPr id="76" name="TextBox 75">
+          <p:cNvPr id="31" name="TextBox 30">
             <a:extLst>
               <a:ext uri="{FF2B5EF4-FFF2-40B4-BE49-F238E27FC236}">
-                <a16:creationId xmlns:a16="http://schemas.microsoft.com/office/drawing/2014/main" id="{A17F0A73-0425-44F5-B721-87332422D1F7}"/>
+                <a16:creationId xmlns:a16="http://schemas.microsoft.com/office/drawing/2014/main" id="{478D9331-26E4-43AB-B76E-285227A963C3}"/>
               </a:ext>
             </a:extLst>
           </p:cNvPr>
@@ -3909,10 +3907,10 @@
       </p:sp>
       <p:cxnSp>
         <p:nvCxnSpPr>
-          <p:cNvPr id="77" name="Straight Connector 76">
+          <p:cNvPr id="32" name="Straight Connector 31">
             <a:extLst>
               <a:ext uri="{FF2B5EF4-FFF2-40B4-BE49-F238E27FC236}">
-                <a16:creationId xmlns:a16="http://schemas.microsoft.com/office/drawing/2014/main" id="{403F45C3-56F0-4B91-8082-50F0096BBC01}"/>
+                <a16:creationId xmlns:a16="http://schemas.microsoft.com/office/drawing/2014/main" id="{7AC14612-FAF7-4F29-933D-EFD575EA6101}"/>
               </a:ext>
             </a:extLst>
           </p:cNvPr>
@@ -3953,10 +3951,10 @@
       </p:cxnSp>
       <p:sp>
         <p:nvSpPr>
-          <p:cNvPr id="78" name="TextBox 77">
+          <p:cNvPr id="33" name="TextBox 32">
             <a:extLst>
               <a:ext uri="{FF2B5EF4-FFF2-40B4-BE49-F238E27FC236}">
-                <a16:creationId xmlns:a16="http://schemas.microsoft.com/office/drawing/2014/main" id="{D9C08DF4-65C8-4EDA-81B4-2AC283EA737E}"/>
+                <a16:creationId xmlns:a16="http://schemas.microsoft.com/office/drawing/2014/main" id="{CD6626ED-DC46-4605-86E0-6B77ABB5F91B}"/>
               </a:ext>
             </a:extLst>
           </p:cNvPr>
@@ -3988,10 +3986,10 @@
       </p:sp>
       <p:cxnSp>
         <p:nvCxnSpPr>
-          <p:cNvPr id="79" name="Straight Connector 78">
+          <p:cNvPr id="34" name="Straight Connector 33">
             <a:extLst>
               <a:ext uri="{FF2B5EF4-FFF2-40B4-BE49-F238E27FC236}">
-                <a16:creationId xmlns:a16="http://schemas.microsoft.com/office/drawing/2014/main" id="{B7291721-D1EF-49F1-9B6E-D929CCC232BA}"/>
+                <a16:creationId xmlns:a16="http://schemas.microsoft.com/office/drawing/2014/main" id="{505CC9D4-4513-4FD2-987F-15BE397F07E0}"/>
               </a:ext>
             </a:extLst>
           </p:cNvPr>
@@ -4031,10 +4029,10 @@
       </p:cxnSp>
       <p:sp>
         <p:nvSpPr>
-          <p:cNvPr id="80" name="TextBox 79">
+          <p:cNvPr id="35" name="TextBox 34">
             <a:extLst>
               <a:ext uri="{FF2B5EF4-FFF2-40B4-BE49-F238E27FC236}">
-                <a16:creationId xmlns:a16="http://schemas.microsoft.com/office/drawing/2014/main" id="{97BB8298-58C5-4F46-AD78-F16727049740}"/>
+                <a16:creationId xmlns:a16="http://schemas.microsoft.com/office/drawing/2014/main" id="{878FF700-3069-4BFA-83D9-B5C8E51EB129}"/>
               </a:ext>
             </a:extLst>
           </p:cNvPr>
@@ -4066,10 +4064,10 @@
       </p:sp>
       <p:cxnSp>
         <p:nvCxnSpPr>
-          <p:cNvPr id="81" name="Straight Connector 80">
+          <p:cNvPr id="36" name="Straight Connector 35">
             <a:extLst>
               <a:ext uri="{FF2B5EF4-FFF2-40B4-BE49-F238E27FC236}">
-                <a16:creationId xmlns:a16="http://schemas.microsoft.com/office/drawing/2014/main" id="{8786DC9F-F0C5-4F56-88BA-4BF87900AE44}"/>
+                <a16:creationId xmlns:a16="http://schemas.microsoft.com/office/drawing/2014/main" id="{790E7FE7-7144-4DF6-A6E4-757C6B8E9C2C}"/>
               </a:ext>
             </a:extLst>
           </p:cNvPr>
@@ -4109,10 +4107,10 @@
       </p:cxnSp>
       <p:sp>
         <p:nvSpPr>
-          <p:cNvPr id="82" name="TextBox 81">
+          <p:cNvPr id="37" name="TextBox 36">
             <a:extLst>
               <a:ext uri="{FF2B5EF4-FFF2-40B4-BE49-F238E27FC236}">
-                <a16:creationId xmlns:a16="http://schemas.microsoft.com/office/drawing/2014/main" id="{0D18E419-6DED-44AD-8C62-E36F12FCD759}"/>
+                <a16:creationId xmlns:a16="http://schemas.microsoft.com/office/drawing/2014/main" id="{C95FDC63-B13B-4446-ADA0-0A0C450337CF}"/>
               </a:ext>
             </a:extLst>
           </p:cNvPr>
@@ -4144,10 +4142,10 @@
       </p:sp>
       <p:sp>
         <p:nvSpPr>
-          <p:cNvPr id="83" name="TextBox 82">
+          <p:cNvPr id="38" name="TextBox 37">
             <a:extLst>
               <a:ext uri="{FF2B5EF4-FFF2-40B4-BE49-F238E27FC236}">
-                <a16:creationId xmlns:a16="http://schemas.microsoft.com/office/drawing/2014/main" id="{AE15A38A-5761-4D4C-AF59-9736ACA094CF}"/>
+                <a16:creationId xmlns:a16="http://schemas.microsoft.com/office/drawing/2014/main" id="{E10024AC-8D9A-432C-AB61-575E9BBB09D0}"/>
               </a:ext>
             </a:extLst>
           </p:cNvPr>
@@ -4156,7 +4154,7 @@
         </p:nvSpPr>
         <p:spPr>
           <a:xfrm rot="16200000">
-            <a:off x="125294" y="3357767"/>
+            <a:off x="120605" y="2926361"/>
             <a:ext cx="1131127" cy="338554"/>
           </a:xfrm>
           <a:prstGeom prst="rect">
@@ -4185,22 +4183,20 @@
             <a:r>
               <a:rPr lang="en-GB" sz="800" dirty="0">
                 <a:solidFill>
-                  <a:schemeClr val="accent2">
-                    <a:lumMod val="75000"/>
-                  </a:schemeClr>
+                  <a:srgbClr val="7030A0"/>
                 </a:solidFill>
               </a:rPr>
-              <a:t>0000 – 1200 LST</a:t>
-            </a:r>
-          </a:p>
-        </p:txBody>
-      </p:sp>
-      <p:sp>
-        <p:nvSpPr>
-          <p:cNvPr id="84" name="TextBox 83">
+              <a:t>(0000 – 1200 LST)</a:t>
+            </a:r>
+          </a:p>
+        </p:txBody>
+      </p:sp>
+      <p:sp>
+        <p:nvSpPr>
+          <p:cNvPr id="39" name="TextBox 38">
             <a:extLst>
               <a:ext uri="{FF2B5EF4-FFF2-40B4-BE49-F238E27FC236}">
-                <a16:creationId xmlns:a16="http://schemas.microsoft.com/office/drawing/2014/main" id="{8187DD6D-AEA0-4F8A-A98D-8F04514EF3FA}"/>
+                <a16:creationId xmlns:a16="http://schemas.microsoft.com/office/drawing/2014/main" id="{01324B42-26A5-4007-975F-2916ECF3FF0A}"/>
               </a:ext>
             </a:extLst>
           </p:cNvPr>
@@ -4209,7 +4205,7 @@
         </p:nvSpPr>
         <p:spPr>
           <a:xfrm rot="16200000">
-            <a:off x="458181" y="3357767"/>
+            <a:off x="453492" y="2926361"/>
             <a:ext cx="1131127" cy="338554"/>
           </a:xfrm>
           <a:prstGeom prst="rect">
@@ -4227,7 +4223,7 @@
             <a:r>
               <a:rPr lang="en-GB" sz="800" dirty="0">
                 <a:solidFill>
-                  <a:srgbClr val="7030A0"/>
+                  <a:srgbClr val="00B0F0"/>
                 </a:solidFill>
               </a:rPr>
               <a:t>1200 – 0000 UTC</a:t>
@@ -4238,22 +4234,20 @@
             <a:r>
               <a:rPr lang="en-GB" sz="800" dirty="0">
                 <a:solidFill>
-                  <a:schemeClr val="accent2">
-                    <a:lumMod val="75000"/>
-                  </a:schemeClr>
+                  <a:srgbClr val="00B0F0"/>
                 </a:solidFill>
               </a:rPr>
-              <a:t>0600 – 1800 LST</a:t>
-            </a:r>
-          </a:p>
-        </p:txBody>
-      </p:sp>
-      <p:sp>
-        <p:nvSpPr>
-          <p:cNvPr id="85" name="TextBox 84">
+              <a:t>(0600 – 1800 LST)</a:t>
+            </a:r>
+          </a:p>
+        </p:txBody>
+      </p:sp>
+      <p:sp>
+        <p:nvSpPr>
+          <p:cNvPr id="40" name="TextBox 39">
             <a:extLst>
               <a:ext uri="{FF2B5EF4-FFF2-40B4-BE49-F238E27FC236}">
-                <a16:creationId xmlns:a16="http://schemas.microsoft.com/office/drawing/2014/main" id="{DF1AB0F1-8E0F-413B-A5EA-E4623932E47C}"/>
+                <a16:creationId xmlns:a16="http://schemas.microsoft.com/office/drawing/2014/main" id="{31868FCF-D502-4785-80D7-584AC15DB2AA}"/>
               </a:ext>
             </a:extLst>
           </p:cNvPr>
@@ -4262,7 +4256,7 @@
         </p:nvSpPr>
         <p:spPr>
           <a:xfrm rot="16200000">
-            <a:off x="791068" y="3357767"/>
+            <a:off x="786379" y="2926361"/>
             <a:ext cx="1131127" cy="338554"/>
           </a:xfrm>
           <a:prstGeom prst="rect">
@@ -4280,7 +4274,7 @@
             <a:r>
               <a:rPr lang="en-GB" sz="800" dirty="0">
                 <a:solidFill>
-                  <a:srgbClr val="7030A0"/>
+                  <a:srgbClr val="FF3838"/>
                 </a:solidFill>
               </a:rPr>
               <a:t>1800 – 0600 UTC</a:t>
@@ -4291,22 +4285,20 @@
             <a:r>
               <a:rPr lang="en-GB" sz="800" dirty="0">
                 <a:solidFill>
-                  <a:schemeClr val="accent2">
-                    <a:lumMod val="75000"/>
-                  </a:schemeClr>
+                  <a:srgbClr val="FF3838"/>
                 </a:solidFill>
               </a:rPr>
-              <a:t>1200 – 0000 LST</a:t>
-            </a:r>
-          </a:p>
-        </p:txBody>
-      </p:sp>
-      <p:sp>
-        <p:nvSpPr>
-          <p:cNvPr id="86" name="TextBox 85">
+              <a:t>(1200 – 0000 LST)</a:t>
+            </a:r>
+          </a:p>
+        </p:txBody>
+      </p:sp>
+      <p:sp>
+        <p:nvSpPr>
+          <p:cNvPr id="41" name="TextBox 40">
             <a:extLst>
               <a:ext uri="{FF2B5EF4-FFF2-40B4-BE49-F238E27FC236}">
-                <a16:creationId xmlns:a16="http://schemas.microsoft.com/office/drawing/2014/main" id="{0FFDF1FE-4B87-4354-9B0A-63D3BD2F5CEA}"/>
+                <a16:creationId xmlns:a16="http://schemas.microsoft.com/office/drawing/2014/main" id="{71934EAA-02AC-476A-BFD2-65E9D9663E87}"/>
               </a:ext>
             </a:extLst>
           </p:cNvPr>
@@ -4315,7 +4307,7 @@
         </p:nvSpPr>
         <p:spPr>
           <a:xfrm rot="16200000">
-            <a:off x="1123955" y="3357767"/>
+            <a:off x="1119266" y="2926361"/>
             <a:ext cx="1131127" cy="338554"/>
           </a:xfrm>
           <a:prstGeom prst="rect">
@@ -4333,7 +4325,7 @@
             <a:r>
               <a:rPr lang="en-GB" sz="800" dirty="0">
                 <a:solidFill>
-                  <a:srgbClr val="7030A0"/>
+                  <a:srgbClr val="00B050"/>
                 </a:solidFill>
               </a:rPr>
               <a:t>0000 – 1200 UTC</a:t>
@@ -4344,22 +4336,20 @@
             <a:r>
               <a:rPr lang="en-GB" sz="800" dirty="0">
                 <a:solidFill>
-                  <a:schemeClr val="accent2">
-                    <a:lumMod val="75000"/>
-                  </a:schemeClr>
+                  <a:srgbClr val="00B050"/>
                 </a:solidFill>
               </a:rPr>
-              <a:t>1800 – 0600 LST</a:t>
-            </a:r>
-          </a:p>
-        </p:txBody>
-      </p:sp>
-      <p:sp>
-        <p:nvSpPr>
-          <p:cNvPr id="87" name="TextBox 86">
+              <a:t>(1800 – 0600 LST)</a:t>
+            </a:r>
+          </a:p>
+        </p:txBody>
+      </p:sp>
+      <p:sp>
+        <p:nvSpPr>
+          <p:cNvPr id="42" name="TextBox 41">
             <a:extLst>
               <a:ext uri="{FF2B5EF4-FFF2-40B4-BE49-F238E27FC236}">
-                <a16:creationId xmlns:a16="http://schemas.microsoft.com/office/drawing/2014/main" id="{D8756620-1F10-41A1-9B77-1047D96F123D}"/>
+                <a16:creationId xmlns:a16="http://schemas.microsoft.com/office/drawing/2014/main" id="{88B28942-5A71-4B06-919D-6366AAD65DBF}"/>
               </a:ext>
             </a:extLst>
           </p:cNvPr>
@@ -4368,7 +4358,7 @@
         </p:nvSpPr>
         <p:spPr>
           <a:xfrm rot="16200000">
-            <a:off x="1456842" y="3357767"/>
+            <a:off x="1452153" y="2926361"/>
             <a:ext cx="1131127" cy="338554"/>
           </a:xfrm>
           <a:prstGeom prst="rect">
@@ -4397,22 +4387,20 @@
             <a:r>
               <a:rPr lang="en-GB" sz="800" dirty="0">
                 <a:solidFill>
-                  <a:schemeClr val="accent2">
-                    <a:lumMod val="75000"/>
-                  </a:schemeClr>
+                  <a:srgbClr val="7030A0"/>
                 </a:solidFill>
               </a:rPr>
-              <a:t>0000 – 1200 LST</a:t>
-            </a:r>
-          </a:p>
-        </p:txBody>
-      </p:sp>
-      <p:sp>
-        <p:nvSpPr>
-          <p:cNvPr id="88" name="TextBox 87">
+              <a:t>(0000 – 1200 LST)</a:t>
+            </a:r>
+          </a:p>
+        </p:txBody>
+      </p:sp>
+      <p:sp>
+        <p:nvSpPr>
+          <p:cNvPr id="43" name="TextBox 42">
             <a:extLst>
               <a:ext uri="{FF2B5EF4-FFF2-40B4-BE49-F238E27FC236}">
-                <a16:creationId xmlns:a16="http://schemas.microsoft.com/office/drawing/2014/main" id="{A910D18F-111E-4E46-9383-327863AAD9F0}"/>
+                <a16:creationId xmlns:a16="http://schemas.microsoft.com/office/drawing/2014/main" id="{DF9768C6-1EA7-48E4-A7C4-D530232761D7}"/>
               </a:ext>
             </a:extLst>
           </p:cNvPr>
@@ -4421,7 +4409,7 @@
         </p:nvSpPr>
         <p:spPr>
           <a:xfrm rot="16200000">
-            <a:off x="1789729" y="3357767"/>
+            <a:off x="1785040" y="2926361"/>
             <a:ext cx="1131127" cy="338554"/>
           </a:xfrm>
           <a:prstGeom prst="rect">
@@ -4439,7 +4427,7 @@
             <a:r>
               <a:rPr lang="en-GB" sz="800" dirty="0">
                 <a:solidFill>
-                  <a:srgbClr val="7030A0"/>
+                  <a:srgbClr val="00B0F0"/>
                 </a:solidFill>
               </a:rPr>
               <a:t>1200 – 0000 UTC</a:t>
@@ -4450,22 +4438,20 @@
             <a:r>
               <a:rPr lang="en-GB" sz="800" dirty="0">
                 <a:solidFill>
-                  <a:schemeClr val="accent2">
-                    <a:lumMod val="75000"/>
-                  </a:schemeClr>
+                  <a:srgbClr val="00B0F0"/>
                 </a:solidFill>
               </a:rPr>
-              <a:t>0600 – 1800 LST</a:t>
+              <a:t>(0600 – 1800 LST)</a:t>
             </a:r>
           </a:p>
         </p:txBody>
       </p:sp>
       <p:pic>
         <p:nvPicPr>
-          <p:cNvPr id="89" name="Graphic 88">
+          <p:cNvPr id="44" name="Graphic 43">
             <a:extLst>
               <a:ext uri="{FF2B5EF4-FFF2-40B4-BE49-F238E27FC236}">
-                <a16:creationId xmlns:a16="http://schemas.microsoft.com/office/drawing/2014/main" id="{5D734ABA-721F-4AE6-88DC-A0592A941327}"/>
+                <a16:creationId xmlns:a16="http://schemas.microsoft.com/office/drawing/2014/main" id="{226AFAD0-6AB0-4B3E-B482-8A6241F481C0}"/>
               </a:ext>
             </a:extLst>
           </p:cNvPr>
@@ -4501,10 +4487,10 @@
       </p:pic>
       <p:sp>
         <p:nvSpPr>
-          <p:cNvPr id="90" name="TextBox 89">
+          <p:cNvPr id="45" name="TextBox 44">
             <a:extLst>
               <a:ext uri="{FF2B5EF4-FFF2-40B4-BE49-F238E27FC236}">
-                <a16:creationId xmlns:a16="http://schemas.microsoft.com/office/drawing/2014/main" id="{9A97FA8D-3E31-449D-A465-45FF5DAB9D09}"/>
+                <a16:creationId xmlns:a16="http://schemas.microsoft.com/office/drawing/2014/main" id="{CB7AB357-4408-4D9B-8FF9-07DB9C1357E2}"/>
               </a:ext>
             </a:extLst>
           </p:cNvPr>
@@ -4513,7 +4499,7 @@
         </p:nvSpPr>
         <p:spPr>
           <a:xfrm rot="16200000">
-            <a:off x="2122616" y="3357767"/>
+            <a:off x="2117927" y="2926361"/>
             <a:ext cx="1131127" cy="338554"/>
           </a:xfrm>
           <a:prstGeom prst="rect">
@@ -4531,7 +4517,7 @@
             <a:r>
               <a:rPr lang="en-GB" sz="800" dirty="0">
                 <a:solidFill>
-                  <a:srgbClr val="7030A0"/>
+                  <a:srgbClr val="FF3838"/>
                 </a:solidFill>
               </a:rPr>
               <a:t>1800 – 0600 UTC</a:t>
@@ -4542,22 +4528,20 @@
             <a:r>
               <a:rPr lang="en-GB" sz="800" dirty="0">
                 <a:solidFill>
-                  <a:schemeClr val="accent2">
-                    <a:lumMod val="75000"/>
-                  </a:schemeClr>
+                  <a:srgbClr val="FF3838"/>
                 </a:solidFill>
               </a:rPr>
-              <a:t>1200 – 0000 LST</a:t>
-            </a:r>
-          </a:p>
-        </p:txBody>
-      </p:sp>
-      <p:sp>
-        <p:nvSpPr>
-          <p:cNvPr id="91" name="TextBox 90">
+              <a:t>(1200 – 0000 LST)</a:t>
+            </a:r>
+          </a:p>
+        </p:txBody>
+      </p:sp>
+      <p:sp>
+        <p:nvSpPr>
+          <p:cNvPr id="46" name="TextBox 45">
             <a:extLst>
               <a:ext uri="{FF2B5EF4-FFF2-40B4-BE49-F238E27FC236}">
-                <a16:creationId xmlns:a16="http://schemas.microsoft.com/office/drawing/2014/main" id="{381D89FD-437D-4FC7-A1D5-1A20FC2C7AA5}"/>
+                <a16:creationId xmlns:a16="http://schemas.microsoft.com/office/drawing/2014/main" id="{30417234-39C3-4EEF-BF2C-1D2D1C5781BA}"/>
               </a:ext>
             </a:extLst>
           </p:cNvPr>
@@ -4566,7 +4550,7 @@
         </p:nvSpPr>
         <p:spPr>
           <a:xfrm rot="16200000">
-            <a:off x="2455505" y="3357767"/>
+            <a:off x="2450816" y="2926361"/>
             <a:ext cx="1131127" cy="338554"/>
           </a:xfrm>
           <a:prstGeom prst="rect">
@@ -4584,7 +4568,7 @@
             <a:r>
               <a:rPr lang="en-GB" sz="800" dirty="0">
                 <a:solidFill>
-                  <a:srgbClr val="7030A0"/>
+                  <a:srgbClr val="00B050"/>
                 </a:solidFill>
               </a:rPr>
               <a:t>0000 – 1200 UTC</a:t>
@@ -4595,174 +4579,10 @@
             <a:r>
               <a:rPr lang="en-GB" sz="800" dirty="0">
                 <a:solidFill>
-                  <a:schemeClr val="accent2">
-                    <a:lumMod val="75000"/>
-                  </a:schemeClr>
+                  <a:srgbClr val="00B050"/>
                 </a:solidFill>
               </a:rPr>
-              <a:t>1800 – 0600 LST</a:t>
-            </a:r>
-          </a:p>
-        </p:txBody>
-      </p:sp>
-      <p:sp>
-        <p:nvSpPr>
-          <p:cNvPr id="92" name="TextBox 91">
-            <a:extLst>
-              <a:ext uri="{FF2B5EF4-FFF2-40B4-BE49-F238E27FC236}">
-                <a16:creationId xmlns:a16="http://schemas.microsoft.com/office/drawing/2014/main" id="{FC3381C6-2174-422A-8B9C-53D769020B1E}"/>
-              </a:ext>
-            </a:extLst>
-          </p:cNvPr>
-          <p:cNvSpPr txBox="1"/>
-          <p:nvPr/>
-        </p:nvSpPr>
-        <p:spPr>
-          <a:xfrm>
-            <a:off x="338922" y="2659222"/>
-            <a:ext cx="1008839" cy="246221"/>
-          </a:xfrm>
-          <a:prstGeom prst="rect">
-            <a:avLst/>
-          </a:prstGeom>
-          <a:noFill/>
-        </p:spPr>
-        <p:txBody>
-          <a:bodyPr wrap="square" rtlCol="0">
-            <a:spAutoFit/>
-          </a:bodyPr>
-          <a:lstStyle/>
-          <a:p>
-            <a:pPr algn="ctr"/>
-            <a:r>
-              <a:rPr lang="en-GB" sz="1000" dirty="0"/>
-              <a:t>Day1</a:t>
-            </a:r>
-          </a:p>
-        </p:txBody>
-      </p:sp>
-      <p:cxnSp>
-        <p:nvCxnSpPr>
-          <p:cNvPr id="93" name="Straight Arrow Connector 92">
-            <a:extLst>
-              <a:ext uri="{FF2B5EF4-FFF2-40B4-BE49-F238E27FC236}">
-                <a16:creationId xmlns:a16="http://schemas.microsoft.com/office/drawing/2014/main" id="{D2FD6BEC-E6C2-4FC7-951A-11C73FF04C36}"/>
-              </a:ext>
-            </a:extLst>
-          </p:cNvPr>
-          <p:cNvCxnSpPr>
-            <a:cxnSpLocks/>
-          </p:cNvCxnSpPr>
-          <p:nvPr/>
-        </p:nvCxnSpPr>
-        <p:spPr>
-          <a:xfrm>
-            <a:off x="338923" y="2680945"/>
-            <a:ext cx="1008839" cy="0"/>
-          </a:xfrm>
-          <a:prstGeom prst="straightConnector1">
-            <a:avLst/>
-          </a:prstGeom>
-          <a:ln>
-            <a:solidFill>
-              <a:schemeClr val="tx1"/>
-            </a:solidFill>
-            <a:headEnd type="triangle"/>
-            <a:tailEnd type="triangle"/>
-          </a:ln>
-        </p:spPr>
-        <p:style>
-          <a:lnRef idx="1">
-            <a:schemeClr val="accent1"/>
-          </a:lnRef>
-          <a:fillRef idx="0">
-            <a:schemeClr val="accent1"/>
-          </a:fillRef>
-          <a:effectRef idx="0">
-            <a:schemeClr val="accent1"/>
-          </a:effectRef>
-          <a:fontRef idx="minor">
-            <a:schemeClr val="tx1"/>
-          </a:fontRef>
-        </p:style>
-      </p:cxnSp>
-      <p:cxnSp>
-        <p:nvCxnSpPr>
-          <p:cNvPr id="94" name="Straight Arrow Connector 93">
-            <a:extLst>
-              <a:ext uri="{FF2B5EF4-FFF2-40B4-BE49-F238E27FC236}">
-                <a16:creationId xmlns:a16="http://schemas.microsoft.com/office/drawing/2014/main" id="{72293E91-EB53-4851-9EB5-DFFC7DB7CF03}"/>
-              </a:ext>
-            </a:extLst>
-          </p:cNvPr>
-          <p:cNvCxnSpPr>
-            <a:cxnSpLocks/>
-          </p:cNvCxnSpPr>
-          <p:nvPr/>
-        </p:nvCxnSpPr>
-        <p:spPr>
-          <a:xfrm>
-            <a:off x="1689518" y="2680945"/>
-            <a:ext cx="1004685" cy="0"/>
-          </a:xfrm>
-          <a:prstGeom prst="straightConnector1">
-            <a:avLst/>
-          </a:prstGeom>
-          <a:ln>
-            <a:solidFill>
-              <a:schemeClr val="tx1"/>
-            </a:solidFill>
-            <a:headEnd type="triangle"/>
-            <a:tailEnd type="triangle"/>
-          </a:ln>
-        </p:spPr>
-        <p:style>
-          <a:lnRef idx="1">
-            <a:schemeClr val="accent1"/>
-          </a:lnRef>
-          <a:fillRef idx="0">
-            <a:schemeClr val="accent1"/>
-          </a:fillRef>
-          <a:effectRef idx="0">
-            <a:schemeClr val="accent1"/>
-          </a:effectRef>
-          <a:fontRef idx="minor">
-            <a:schemeClr val="tx1"/>
-          </a:fontRef>
-        </p:style>
-      </p:cxnSp>
-      <p:sp>
-        <p:nvSpPr>
-          <p:cNvPr id="95" name="TextBox 94">
-            <a:extLst>
-              <a:ext uri="{FF2B5EF4-FFF2-40B4-BE49-F238E27FC236}">
-                <a16:creationId xmlns:a16="http://schemas.microsoft.com/office/drawing/2014/main" id="{D0C33EEA-8A2F-4F09-9AD9-1D81AD0187D1}"/>
-              </a:ext>
-            </a:extLst>
-          </p:cNvPr>
-          <p:cNvSpPr txBox="1"/>
-          <p:nvPr/>
-        </p:nvSpPr>
-        <p:spPr>
-          <a:xfrm>
-            <a:off x="1678286" y="2659222"/>
-            <a:ext cx="1008839" cy="246221"/>
-          </a:xfrm>
-          <a:prstGeom prst="rect">
-            <a:avLst/>
-          </a:prstGeom>
-          <a:noFill/>
-        </p:spPr>
-        <p:txBody>
-          <a:bodyPr wrap="square" rtlCol="0">
-            <a:spAutoFit/>
-          </a:bodyPr>
-          <a:lstStyle/>
-          <a:p>
-            <a:pPr algn="ctr"/>
-            <a:r>
-              <a:rPr lang="en-GB" sz="1000" dirty="0"/>
-              <a:t>Day2</a:t>
+              <a:t>(1800 – 0600 LST)</a:t>
             </a:r>
           </a:p>
         </p:txBody>

</xml_diff>

<commit_message>
Papers second draft excluding conclusions
</commit_message>
<xml_diff>
--- a/Manuscript/Figures/Diurnal_Cycle.pptx
+++ b/Manuscript/Figures/Diurnal_Cycle.pptx
@@ -115,13 +115,373 @@
 <file path=ppt/revisionInfo.xml><?xml version="1.0" encoding="utf-8"?>
 <p1510:revInfo xmlns:a="http://schemas.openxmlformats.org/drawingml/2006/main" xmlns:r="http://schemas.openxmlformats.org/officeDocument/2006/relationships" xmlns:p1510="http://schemas.microsoft.com/office/powerpoint/2015/10/main">
   <p1510:revLst>
-    <p1510:client id="{6D6DCAB1-8075-40B9-A710-B02A73BE3A7B}" v="15" dt="2022-01-27T17:31:48.433"/>
+    <p1510:client id="{65A1F213-F3A5-41F5-8C42-0FA62DB7E8D2}" v="3" dt="2022-03-26T11:44:00.064"/>
   </p1510:revLst>
 </p1510:revInfo>
 </file>
 
 <file path=ppt/changesInfos/changesInfo1.xml><?xml version="1.0" encoding="utf-8"?>
 <pc:chgInfo xmlns:a="http://schemas.openxmlformats.org/drawingml/2006/main" xmlns:r="http://schemas.openxmlformats.org/officeDocument/2006/relationships" xmlns:ac="http://schemas.microsoft.com/office/drawing/2013/main/command" xmlns:pc="http://schemas.microsoft.com/office/powerpoint/2013/main/command">
+  <pc:docChgLst>
+    <pc:chgData name="Fatima Pillosu" userId="a6295d4dc9e22643" providerId="LiveId" clId="{65A1F213-F3A5-41F5-8C42-0FA62DB7E8D2}"/>
+    <pc:docChg chg="undo custSel modSld">
+      <pc:chgData name="Fatima Pillosu" userId="a6295d4dc9e22643" providerId="LiveId" clId="{65A1F213-F3A5-41F5-8C42-0FA62DB7E8D2}" dt="2022-03-26T12:41:37.991" v="155" actId="20577"/>
+      <pc:docMkLst>
+        <pc:docMk/>
+      </pc:docMkLst>
+      <pc:sldChg chg="addSp delSp modSp mod">
+        <pc:chgData name="Fatima Pillosu" userId="a6295d4dc9e22643" providerId="LiveId" clId="{65A1F213-F3A5-41F5-8C42-0FA62DB7E8D2}" dt="2022-03-26T12:41:37.991" v="155" actId="20577"/>
+        <pc:sldMkLst>
+          <pc:docMk/>
+          <pc:sldMk cId="476916253" sldId="256"/>
+        </pc:sldMkLst>
+        <pc:spChg chg="add mod ord">
+          <ac:chgData name="Fatima Pillosu" userId="a6295d4dc9e22643" providerId="LiveId" clId="{65A1F213-F3A5-41F5-8C42-0FA62DB7E8D2}" dt="2022-03-26T11:47:37.408" v="123" actId="255"/>
+          <ac:spMkLst>
+            <pc:docMk/>
+            <pc:sldMk cId="476916253" sldId="256"/>
+            <ac:spMk id="2" creationId="{8D806A4D-7727-4354-AADB-5B6FE5BFA807}"/>
+          </ac:spMkLst>
+        </pc:spChg>
+        <pc:spChg chg="add mod">
+          <ac:chgData name="Fatima Pillosu" userId="a6295d4dc9e22643" providerId="LiveId" clId="{65A1F213-F3A5-41F5-8C42-0FA62DB7E8D2}" dt="2022-03-26T11:46:39.620" v="109" actId="1036"/>
+          <ac:spMkLst>
+            <pc:docMk/>
+            <pc:sldMk cId="476916253" sldId="256"/>
+            <ac:spMk id="3" creationId="{81A79DA1-CA5D-4B48-8117-C239F2D36BAC}"/>
+          </ac:spMkLst>
+        </pc:spChg>
+        <pc:spChg chg="add mod">
+          <ac:chgData name="Fatima Pillosu" userId="a6295d4dc9e22643" providerId="LiveId" clId="{65A1F213-F3A5-41F5-8C42-0FA62DB7E8D2}" dt="2022-03-26T11:47:02.158" v="116" actId="14100"/>
+          <ac:spMkLst>
+            <pc:docMk/>
+            <pc:sldMk cId="476916253" sldId="256"/>
+            <ac:spMk id="4" creationId="{8BD3E922-5972-4E51-86D8-A5354F849C2D}"/>
+          </ac:spMkLst>
+        </pc:spChg>
+        <pc:spChg chg="add mod ord">
+          <ac:chgData name="Fatima Pillosu" userId="a6295d4dc9e22643" providerId="LiveId" clId="{65A1F213-F3A5-41F5-8C42-0FA62DB7E8D2}" dt="2022-03-26T12:41:07.702" v="145" actId="20577"/>
+          <ac:spMkLst>
+            <pc:docMk/>
+            <pc:sldMk cId="476916253" sldId="256"/>
+            <ac:spMk id="22" creationId="{9C7BE802-90A6-449E-80E0-3BD9D47057C3}"/>
+          </ac:spMkLst>
+        </pc:spChg>
+        <pc:spChg chg="add mod ord">
+          <ac:chgData name="Fatima Pillosu" userId="a6295d4dc9e22643" providerId="LiveId" clId="{65A1F213-F3A5-41F5-8C42-0FA62DB7E8D2}" dt="2022-03-26T12:41:37.991" v="155" actId="20577"/>
+          <ac:spMkLst>
+            <pc:docMk/>
+            <pc:sldMk cId="476916253" sldId="256"/>
+            <ac:spMk id="23" creationId="{96B9585E-AD8F-428C-9A04-EF5F51525FD7}"/>
+          </ac:spMkLst>
+        </pc:spChg>
+        <pc:spChg chg="add mod">
+          <ac:chgData name="Fatima Pillosu" userId="a6295d4dc9e22643" providerId="LiveId" clId="{65A1F213-F3A5-41F5-8C42-0FA62DB7E8D2}" dt="2022-03-26T11:47:08.944" v="120" actId="1035"/>
+          <ac:spMkLst>
+            <pc:docMk/>
+            <pc:sldMk cId="476916253" sldId="256"/>
+            <ac:spMk id="25" creationId="{3272CF81-793D-457C-857B-B598383B4BC9}"/>
+          </ac:spMkLst>
+        </pc:spChg>
+        <pc:spChg chg="del">
+          <ac:chgData name="Fatima Pillosu" userId="a6295d4dc9e22643" providerId="LiveId" clId="{65A1F213-F3A5-41F5-8C42-0FA62DB7E8D2}" dt="2022-03-26T11:28:57.022" v="0" actId="21"/>
+          <ac:spMkLst>
+            <pc:docMk/>
+            <pc:sldMk cId="476916253" sldId="256"/>
+            <ac:spMk id="27" creationId="{00E90DE2-659E-4F92-9C90-618438314250}"/>
+          </ac:spMkLst>
+        </pc:spChg>
+        <pc:spChg chg="del">
+          <ac:chgData name="Fatima Pillosu" userId="a6295d4dc9e22643" providerId="LiveId" clId="{65A1F213-F3A5-41F5-8C42-0FA62DB7E8D2}" dt="2022-03-26T11:28:57.022" v="0" actId="21"/>
+          <ac:spMkLst>
+            <pc:docMk/>
+            <pc:sldMk cId="476916253" sldId="256"/>
+            <ac:spMk id="28" creationId="{F1F1CEF0-33DD-427A-B476-81848BB2EE82}"/>
+          </ac:spMkLst>
+        </pc:spChg>
+        <pc:spChg chg="del">
+          <ac:chgData name="Fatima Pillosu" userId="a6295d4dc9e22643" providerId="LiveId" clId="{65A1F213-F3A5-41F5-8C42-0FA62DB7E8D2}" dt="2022-03-26T11:28:57.022" v="0" actId="21"/>
+          <ac:spMkLst>
+            <pc:docMk/>
+            <pc:sldMk cId="476916253" sldId="256"/>
+            <ac:spMk id="29" creationId="{DE58D980-EFAB-43A2-AC72-FDB72280FDEE}"/>
+          </ac:spMkLst>
+        </pc:spChg>
+        <pc:spChg chg="del">
+          <ac:chgData name="Fatima Pillosu" userId="a6295d4dc9e22643" providerId="LiveId" clId="{65A1F213-F3A5-41F5-8C42-0FA62DB7E8D2}" dt="2022-03-26T11:28:57.022" v="0" actId="21"/>
+          <ac:spMkLst>
+            <pc:docMk/>
+            <pc:sldMk cId="476916253" sldId="256"/>
+            <ac:spMk id="31" creationId="{478D9331-26E4-43AB-B76E-285227A963C3}"/>
+          </ac:spMkLst>
+        </pc:spChg>
+        <pc:spChg chg="del">
+          <ac:chgData name="Fatima Pillosu" userId="a6295d4dc9e22643" providerId="LiveId" clId="{65A1F213-F3A5-41F5-8C42-0FA62DB7E8D2}" dt="2022-03-26T11:28:57.022" v="0" actId="21"/>
+          <ac:spMkLst>
+            <pc:docMk/>
+            <pc:sldMk cId="476916253" sldId="256"/>
+            <ac:spMk id="33" creationId="{CD6626ED-DC46-4605-86E0-6B77ABB5F91B}"/>
+          </ac:spMkLst>
+        </pc:spChg>
+        <pc:spChg chg="del">
+          <ac:chgData name="Fatima Pillosu" userId="a6295d4dc9e22643" providerId="LiveId" clId="{65A1F213-F3A5-41F5-8C42-0FA62DB7E8D2}" dt="2022-03-26T11:28:57.022" v="0" actId="21"/>
+          <ac:spMkLst>
+            <pc:docMk/>
+            <pc:sldMk cId="476916253" sldId="256"/>
+            <ac:spMk id="35" creationId="{878FF700-3069-4BFA-83D9-B5C8E51EB129}"/>
+          </ac:spMkLst>
+        </pc:spChg>
+        <pc:spChg chg="del">
+          <ac:chgData name="Fatima Pillosu" userId="a6295d4dc9e22643" providerId="LiveId" clId="{65A1F213-F3A5-41F5-8C42-0FA62DB7E8D2}" dt="2022-03-26T11:28:57.022" v="0" actId="21"/>
+          <ac:spMkLst>
+            <pc:docMk/>
+            <pc:sldMk cId="476916253" sldId="256"/>
+            <ac:spMk id="37" creationId="{C95FDC63-B13B-4446-ADA0-0A0C450337CF}"/>
+          </ac:spMkLst>
+        </pc:spChg>
+        <pc:spChg chg="del">
+          <ac:chgData name="Fatima Pillosu" userId="a6295d4dc9e22643" providerId="LiveId" clId="{65A1F213-F3A5-41F5-8C42-0FA62DB7E8D2}" dt="2022-03-26T11:28:57.022" v="0" actId="21"/>
+          <ac:spMkLst>
+            <pc:docMk/>
+            <pc:sldMk cId="476916253" sldId="256"/>
+            <ac:spMk id="38" creationId="{E10024AC-8D9A-432C-AB61-575E9BBB09D0}"/>
+          </ac:spMkLst>
+        </pc:spChg>
+        <pc:spChg chg="del">
+          <ac:chgData name="Fatima Pillosu" userId="a6295d4dc9e22643" providerId="LiveId" clId="{65A1F213-F3A5-41F5-8C42-0FA62DB7E8D2}" dt="2022-03-26T11:28:57.022" v="0" actId="21"/>
+          <ac:spMkLst>
+            <pc:docMk/>
+            <pc:sldMk cId="476916253" sldId="256"/>
+            <ac:spMk id="39" creationId="{01324B42-26A5-4007-975F-2916ECF3FF0A}"/>
+          </ac:spMkLst>
+        </pc:spChg>
+        <pc:spChg chg="del">
+          <ac:chgData name="Fatima Pillosu" userId="a6295d4dc9e22643" providerId="LiveId" clId="{65A1F213-F3A5-41F5-8C42-0FA62DB7E8D2}" dt="2022-03-26T11:28:57.022" v="0" actId="21"/>
+          <ac:spMkLst>
+            <pc:docMk/>
+            <pc:sldMk cId="476916253" sldId="256"/>
+            <ac:spMk id="40" creationId="{31868FCF-D502-4785-80D7-584AC15DB2AA}"/>
+          </ac:spMkLst>
+        </pc:spChg>
+        <pc:spChg chg="del">
+          <ac:chgData name="Fatima Pillosu" userId="a6295d4dc9e22643" providerId="LiveId" clId="{65A1F213-F3A5-41F5-8C42-0FA62DB7E8D2}" dt="2022-03-26T11:28:57.022" v="0" actId="21"/>
+          <ac:spMkLst>
+            <pc:docMk/>
+            <pc:sldMk cId="476916253" sldId="256"/>
+            <ac:spMk id="41" creationId="{71934EAA-02AC-476A-BFD2-65E9D9663E87}"/>
+          </ac:spMkLst>
+        </pc:spChg>
+        <pc:spChg chg="del">
+          <ac:chgData name="Fatima Pillosu" userId="a6295d4dc9e22643" providerId="LiveId" clId="{65A1F213-F3A5-41F5-8C42-0FA62DB7E8D2}" dt="2022-03-26T11:28:57.022" v="0" actId="21"/>
+          <ac:spMkLst>
+            <pc:docMk/>
+            <pc:sldMk cId="476916253" sldId="256"/>
+            <ac:spMk id="42" creationId="{88B28942-5A71-4B06-919D-6366AAD65DBF}"/>
+          </ac:spMkLst>
+        </pc:spChg>
+        <pc:spChg chg="del">
+          <ac:chgData name="Fatima Pillosu" userId="a6295d4dc9e22643" providerId="LiveId" clId="{65A1F213-F3A5-41F5-8C42-0FA62DB7E8D2}" dt="2022-03-26T11:28:57.022" v="0" actId="21"/>
+          <ac:spMkLst>
+            <pc:docMk/>
+            <pc:sldMk cId="476916253" sldId="256"/>
+            <ac:spMk id="43" creationId="{DF9768C6-1EA7-48E4-A7C4-D530232761D7}"/>
+          </ac:spMkLst>
+        </pc:spChg>
+        <pc:spChg chg="del">
+          <ac:chgData name="Fatima Pillosu" userId="a6295d4dc9e22643" providerId="LiveId" clId="{65A1F213-F3A5-41F5-8C42-0FA62DB7E8D2}" dt="2022-03-26T11:28:57.022" v="0" actId="21"/>
+          <ac:spMkLst>
+            <pc:docMk/>
+            <pc:sldMk cId="476916253" sldId="256"/>
+            <ac:spMk id="45" creationId="{CB7AB357-4408-4D9B-8FF9-07DB9C1357E2}"/>
+          </ac:spMkLst>
+        </pc:spChg>
+        <pc:spChg chg="del">
+          <ac:chgData name="Fatima Pillosu" userId="a6295d4dc9e22643" providerId="LiveId" clId="{65A1F213-F3A5-41F5-8C42-0FA62DB7E8D2}" dt="2022-03-26T11:28:57.022" v="0" actId="21"/>
+          <ac:spMkLst>
+            <pc:docMk/>
+            <pc:sldMk cId="476916253" sldId="256"/>
+            <ac:spMk id="46" creationId="{30417234-39C3-4EEF-BF2C-1D2D1C5781BA}"/>
+          </ac:spMkLst>
+        </pc:spChg>
+        <pc:spChg chg="add mod">
+          <ac:chgData name="Fatima Pillosu" userId="a6295d4dc9e22643" providerId="LiveId" clId="{65A1F213-F3A5-41F5-8C42-0FA62DB7E8D2}" dt="2022-03-26T11:47:08.944" v="120" actId="1035"/>
+          <ac:spMkLst>
+            <pc:docMk/>
+            <pc:sldMk cId="476916253" sldId="256"/>
+            <ac:spMk id="47" creationId="{C85108AB-6CF6-4C6D-A3AC-6F3EC134786B}"/>
+          </ac:spMkLst>
+        </pc:spChg>
+        <pc:spChg chg="add mod">
+          <ac:chgData name="Fatima Pillosu" userId="a6295d4dc9e22643" providerId="LiveId" clId="{65A1F213-F3A5-41F5-8C42-0FA62DB7E8D2}" dt="2022-03-26T11:48:11.415" v="144" actId="1037"/>
+          <ac:spMkLst>
+            <pc:docMk/>
+            <pc:sldMk cId="476916253" sldId="256"/>
+            <ac:spMk id="49" creationId="{E20D998A-1B2F-4F92-A28D-99370057CAAA}"/>
+          </ac:spMkLst>
+        </pc:spChg>
+        <pc:spChg chg="add mod">
+          <ac:chgData name="Fatima Pillosu" userId="a6295d4dc9e22643" providerId="LiveId" clId="{65A1F213-F3A5-41F5-8C42-0FA62DB7E8D2}" dt="2022-03-26T11:48:11.415" v="144" actId="1037"/>
+          <ac:spMkLst>
+            <pc:docMk/>
+            <pc:sldMk cId="476916253" sldId="256"/>
+            <ac:spMk id="51" creationId="{40E422A4-4BE9-4B0B-8B34-FE4650B0A6C4}"/>
+          </ac:spMkLst>
+        </pc:spChg>
+        <pc:spChg chg="add mod ord">
+          <ac:chgData name="Fatima Pillosu" userId="a6295d4dc9e22643" providerId="LiveId" clId="{65A1F213-F3A5-41F5-8C42-0FA62DB7E8D2}" dt="2022-03-26T12:41:09.019" v="146" actId="20577"/>
+          <ac:spMkLst>
+            <pc:docMk/>
+            <pc:sldMk cId="476916253" sldId="256"/>
+            <ac:spMk id="52" creationId="{E5A65E4B-9E1F-4B4F-90B0-8E88F6496F7A}"/>
+          </ac:spMkLst>
+        </pc:spChg>
+        <pc:spChg chg="add mod ord">
+          <ac:chgData name="Fatima Pillosu" userId="a6295d4dc9e22643" providerId="LiveId" clId="{65A1F213-F3A5-41F5-8C42-0FA62DB7E8D2}" dt="2022-03-26T12:41:10.269" v="147" actId="20577"/>
+          <ac:spMkLst>
+            <pc:docMk/>
+            <pc:sldMk cId="476916253" sldId="256"/>
+            <ac:spMk id="53" creationId="{B03184C8-2187-492C-9088-7C9CBAD7B209}"/>
+          </ac:spMkLst>
+        </pc:spChg>
+        <pc:spChg chg="add mod ord">
+          <ac:chgData name="Fatima Pillosu" userId="a6295d4dc9e22643" providerId="LiveId" clId="{65A1F213-F3A5-41F5-8C42-0FA62DB7E8D2}" dt="2022-03-26T12:41:11.256" v="148" actId="20577"/>
+          <ac:spMkLst>
+            <pc:docMk/>
+            <pc:sldMk cId="476916253" sldId="256"/>
+            <ac:spMk id="54" creationId="{2F6E0737-39D9-44FB-A2B9-53790B9E95F5}"/>
+          </ac:spMkLst>
+        </pc:spChg>
+        <pc:spChg chg="add mod ord">
+          <ac:chgData name="Fatima Pillosu" userId="a6295d4dc9e22643" providerId="LiveId" clId="{65A1F213-F3A5-41F5-8C42-0FA62DB7E8D2}" dt="2022-03-26T12:41:12.644" v="149" actId="20577"/>
+          <ac:spMkLst>
+            <pc:docMk/>
+            <pc:sldMk cId="476916253" sldId="256"/>
+            <ac:spMk id="55" creationId="{F0A4CE5F-E598-4890-838D-B532B0830D09}"/>
+          </ac:spMkLst>
+        </pc:spChg>
+        <pc:spChg chg="add mod ord">
+          <ac:chgData name="Fatima Pillosu" userId="a6295d4dc9e22643" providerId="LiveId" clId="{65A1F213-F3A5-41F5-8C42-0FA62DB7E8D2}" dt="2022-03-26T12:41:13.646" v="150" actId="20577"/>
+          <ac:spMkLst>
+            <pc:docMk/>
+            <pc:sldMk cId="476916253" sldId="256"/>
+            <ac:spMk id="56" creationId="{7FEFF7F7-0470-48CB-8BA3-3C8C727104B4}"/>
+          </ac:spMkLst>
+        </pc:spChg>
+        <pc:spChg chg="add mod ord">
+          <ac:chgData name="Fatima Pillosu" userId="a6295d4dc9e22643" providerId="LiveId" clId="{65A1F213-F3A5-41F5-8C42-0FA62DB7E8D2}" dt="2022-03-26T12:41:14.665" v="151" actId="20577"/>
+          <ac:spMkLst>
+            <pc:docMk/>
+            <pc:sldMk cId="476916253" sldId="256"/>
+            <ac:spMk id="57" creationId="{52273D43-CB38-4946-B5AF-03FF216B5D15}"/>
+          </ac:spMkLst>
+        </pc:spChg>
+        <pc:spChg chg="add mod ord">
+          <ac:chgData name="Fatima Pillosu" userId="a6295d4dc9e22643" providerId="LiveId" clId="{65A1F213-F3A5-41F5-8C42-0FA62DB7E8D2}" dt="2022-03-26T12:41:15.938" v="152" actId="20577"/>
+          <ac:spMkLst>
+            <pc:docMk/>
+            <pc:sldMk cId="476916253" sldId="256"/>
+            <ac:spMk id="59" creationId="{6E7CA76B-FCAC-4791-B12D-C269E8A017ED}"/>
+          </ac:spMkLst>
+        </pc:spChg>
+        <pc:spChg chg="add mod ord">
+          <ac:chgData name="Fatima Pillosu" userId="a6295d4dc9e22643" providerId="LiveId" clId="{65A1F213-F3A5-41F5-8C42-0FA62DB7E8D2}" dt="2022-03-26T12:41:17.074" v="153" actId="20577"/>
+          <ac:spMkLst>
+            <pc:docMk/>
+            <pc:sldMk cId="476916253" sldId="256"/>
+            <ac:spMk id="60" creationId="{6FE3D72B-2B6D-448F-A637-49C0113C9172}"/>
+          </ac:spMkLst>
+        </pc:spChg>
+        <pc:spChg chg="add mod">
+          <ac:chgData name="Fatima Pillosu" userId="a6295d4dc9e22643" providerId="LiveId" clId="{65A1F213-F3A5-41F5-8C42-0FA62DB7E8D2}" dt="2022-03-26T11:48:00.302" v="133" actId="1037"/>
+          <ac:spMkLst>
+            <pc:docMk/>
+            <pc:sldMk cId="476916253" sldId="256"/>
+            <ac:spMk id="61" creationId="{D1D7AC64-C873-4FE5-944B-9F8061EAC0E3}"/>
+          </ac:spMkLst>
+        </pc:spChg>
+        <pc:picChg chg="del">
+          <ac:chgData name="Fatima Pillosu" userId="a6295d4dc9e22643" providerId="LiveId" clId="{65A1F213-F3A5-41F5-8C42-0FA62DB7E8D2}" dt="2022-03-26T11:28:57.022" v="0" actId="21"/>
+          <ac:picMkLst>
+            <pc:docMk/>
+            <pc:sldMk cId="476916253" sldId="256"/>
+            <ac:picMk id="44" creationId="{226AFAD0-6AB0-4B3E-B482-8A6241F481C0}"/>
+          </ac:picMkLst>
+        </pc:picChg>
+        <pc:picChg chg="add mod modCrop">
+          <ac:chgData name="Fatima Pillosu" userId="a6295d4dc9e22643" providerId="LiveId" clId="{65A1F213-F3A5-41F5-8C42-0FA62DB7E8D2}" dt="2022-03-26T11:47:24.169" v="122" actId="732"/>
+          <ac:picMkLst>
+            <pc:docMk/>
+            <pc:sldMk cId="476916253" sldId="256"/>
+            <ac:picMk id="58" creationId="{19811510-0C66-40C0-852A-7514EF809751}"/>
+          </ac:picMkLst>
+        </pc:picChg>
+        <pc:cxnChg chg="add mod">
+          <ac:chgData name="Fatima Pillosu" userId="a6295d4dc9e22643" providerId="LiveId" clId="{65A1F213-F3A5-41F5-8C42-0FA62DB7E8D2}" dt="2022-03-26T11:47:08.944" v="120" actId="1035"/>
+          <ac:cxnSpMkLst>
+            <pc:docMk/>
+            <pc:sldMk cId="476916253" sldId="256"/>
+            <ac:cxnSpMk id="24" creationId="{0578D5BA-0A89-4DB9-BBA2-233C5FAC86B6}"/>
+          </ac:cxnSpMkLst>
+        </pc:cxnChg>
+        <pc:cxnChg chg="add mod">
+          <ac:chgData name="Fatima Pillosu" userId="a6295d4dc9e22643" providerId="LiveId" clId="{65A1F213-F3A5-41F5-8C42-0FA62DB7E8D2}" dt="2022-03-26T11:47:08.944" v="120" actId="1035"/>
+          <ac:cxnSpMkLst>
+            <pc:docMk/>
+            <pc:sldMk cId="476916253" sldId="256"/>
+            <ac:cxnSpMk id="26" creationId="{A26E6068-3F47-4E14-B2F3-2743B53556B6}"/>
+          </ac:cxnSpMkLst>
+        </pc:cxnChg>
+        <pc:cxnChg chg="del">
+          <ac:chgData name="Fatima Pillosu" userId="a6295d4dc9e22643" providerId="LiveId" clId="{65A1F213-F3A5-41F5-8C42-0FA62DB7E8D2}" dt="2022-03-26T11:28:57.022" v="0" actId="21"/>
+          <ac:cxnSpMkLst>
+            <pc:docMk/>
+            <pc:sldMk cId="476916253" sldId="256"/>
+            <ac:cxnSpMk id="30" creationId="{D31BE9AF-EC05-4759-8FF8-FD7419E0A2C5}"/>
+          </ac:cxnSpMkLst>
+        </pc:cxnChg>
+        <pc:cxnChg chg="del">
+          <ac:chgData name="Fatima Pillosu" userId="a6295d4dc9e22643" providerId="LiveId" clId="{65A1F213-F3A5-41F5-8C42-0FA62DB7E8D2}" dt="2022-03-26T11:28:57.022" v="0" actId="21"/>
+          <ac:cxnSpMkLst>
+            <pc:docMk/>
+            <pc:sldMk cId="476916253" sldId="256"/>
+            <ac:cxnSpMk id="32" creationId="{7AC14612-FAF7-4F29-933D-EFD575EA6101}"/>
+          </ac:cxnSpMkLst>
+        </pc:cxnChg>
+        <pc:cxnChg chg="del">
+          <ac:chgData name="Fatima Pillosu" userId="a6295d4dc9e22643" providerId="LiveId" clId="{65A1F213-F3A5-41F5-8C42-0FA62DB7E8D2}" dt="2022-03-26T11:28:57.022" v="0" actId="21"/>
+          <ac:cxnSpMkLst>
+            <pc:docMk/>
+            <pc:sldMk cId="476916253" sldId="256"/>
+            <ac:cxnSpMk id="34" creationId="{505CC9D4-4513-4FD2-987F-15BE397F07E0}"/>
+          </ac:cxnSpMkLst>
+        </pc:cxnChg>
+        <pc:cxnChg chg="del">
+          <ac:chgData name="Fatima Pillosu" userId="a6295d4dc9e22643" providerId="LiveId" clId="{65A1F213-F3A5-41F5-8C42-0FA62DB7E8D2}" dt="2022-03-26T11:28:57.022" v="0" actId="21"/>
+          <ac:cxnSpMkLst>
+            <pc:docMk/>
+            <pc:sldMk cId="476916253" sldId="256"/>
+            <ac:cxnSpMk id="36" creationId="{790E7FE7-7144-4DF6-A6E4-757C6B8E9C2C}"/>
+          </ac:cxnSpMkLst>
+        </pc:cxnChg>
+        <pc:cxnChg chg="add mod">
+          <ac:chgData name="Fatima Pillosu" userId="a6295d4dc9e22643" providerId="LiveId" clId="{65A1F213-F3A5-41F5-8C42-0FA62DB7E8D2}" dt="2022-03-26T11:48:11.415" v="144" actId="1037"/>
+          <ac:cxnSpMkLst>
+            <pc:docMk/>
+            <pc:sldMk cId="476916253" sldId="256"/>
+            <ac:cxnSpMk id="48" creationId="{06256763-C418-476A-9A63-2233E52816EB}"/>
+          </ac:cxnSpMkLst>
+        </pc:cxnChg>
+        <pc:cxnChg chg="add mod">
+          <ac:chgData name="Fatima Pillosu" userId="a6295d4dc9e22643" providerId="LiveId" clId="{65A1F213-F3A5-41F5-8C42-0FA62DB7E8D2}" dt="2022-03-26T11:48:11.415" v="144" actId="1037"/>
+          <ac:cxnSpMkLst>
+            <pc:docMk/>
+            <pc:sldMk cId="476916253" sldId="256"/>
+            <ac:cxnSpMk id="50" creationId="{2E15FE6C-AE66-44B9-B85F-0CDB63AD046B}"/>
+          </ac:cxnSpMkLst>
+        </pc:cxnChg>
+      </pc:sldChg>
+    </pc:docChg>
+  </pc:docChgLst>
   <pc:docChgLst>
     <pc:chgData name="Fatima Pillosu" userId="a6295d4dc9e22643" providerId="LiveId" clId="{6D6DCAB1-8075-40B9-A710-B02A73BE3A7B}"/>
     <pc:docChg chg="undo custSel modSld">
@@ -976,7 +1336,7 @@
           <a:p>
             <a:fld id="{7FE43369-170B-4886-A028-E14877BC39B1}" type="datetimeFigureOut">
               <a:rPr lang="en-GB" smtClean="0"/>
-              <a:t>02/02/2022</a:t>
+              <a:t>26/03/2022</a:t>
             </a:fld>
             <a:endParaRPr lang="en-GB"/>
           </a:p>
@@ -1146,7 +1506,7 @@
           <a:p>
             <a:fld id="{7FE43369-170B-4886-A028-E14877BC39B1}" type="datetimeFigureOut">
               <a:rPr lang="en-GB" smtClean="0"/>
-              <a:t>02/02/2022</a:t>
+              <a:t>26/03/2022</a:t>
             </a:fld>
             <a:endParaRPr lang="en-GB"/>
           </a:p>
@@ -1326,7 +1686,7 @@
           <a:p>
             <a:fld id="{7FE43369-170B-4886-A028-E14877BC39B1}" type="datetimeFigureOut">
               <a:rPr lang="en-GB" smtClean="0"/>
-              <a:t>02/02/2022</a:t>
+              <a:t>26/03/2022</a:t>
             </a:fld>
             <a:endParaRPr lang="en-GB"/>
           </a:p>
@@ -1496,7 +1856,7 @@
           <a:p>
             <a:fld id="{7FE43369-170B-4886-A028-E14877BC39B1}" type="datetimeFigureOut">
               <a:rPr lang="en-GB" smtClean="0"/>
-              <a:t>02/02/2022</a:t>
+              <a:t>26/03/2022</a:t>
             </a:fld>
             <a:endParaRPr lang="en-GB"/>
           </a:p>
@@ -1740,7 +2100,7 @@
           <a:p>
             <a:fld id="{7FE43369-170B-4886-A028-E14877BC39B1}" type="datetimeFigureOut">
               <a:rPr lang="en-GB" smtClean="0"/>
-              <a:t>02/02/2022</a:t>
+              <a:t>26/03/2022</a:t>
             </a:fld>
             <a:endParaRPr lang="en-GB"/>
           </a:p>
@@ -1972,7 +2332,7 @@
           <a:p>
             <a:fld id="{7FE43369-170B-4886-A028-E14877BC39B1}" type="datetimeFigureOut">
               <a:rPr lang="en-GB" smtClean="0"/>
-              <a:t>02/02/2022</a:t>
+              <a:t>26/03/2022</a:t>
             </a:fld>
             <a:endParaRPr lang="en-GB"/>
           </a:p>
@@ -2339,7 +2699,7 @@
           <a:p>
             <a:fld id="{7FE43369-170B-4886-A028-E14877BC39B1}" type="datetimeFigureOut">
               <a:rPr lang="en-GB" smtClean="0"/>
-              <a:t>02/02/2022</a:t>
+              <a:t>26/03/2022</a:t>
             </a:fld>
             <a:endParaRPr lang="en-GB"/>
           </a:p>
@@ -2457,7 +2817,7 @@
           <a:p>
             <a:fld id="{7FE43369-170B-4886-A028-E14877BC39B1}" type="datetimeFigureOut">
               <a:rPr lang="en-GB" smtClean="0"/>
-              <a:t>02/02/2022</a:t>
+              <a:t>26/03/2022</a:t>
             </a:fld>
             <a:endParaRPr lang="en-GB"/>
           </a:p>
@@ -2552,7 +2912,7 @@
           <a:p>
             <a:fld id="{7FE43369-170B-4886-A028-E14877BC39B1}" type="datetimeFigureOut">
               <a:rPr lang="en-GB" smtClean="0"/>
-              <a:t>02/02/2022</a:t>
+              <a:t>26/03/2022</a:t>
             </a:fld>
             <a:endParaRPr lang="en-GB"/>
           </a:p>
@@ -2829,7 +3189,7 @@
           <a:p>
             <a:fld id="{7FE43369-170B-4886-A028-E14877BC39B1}" type="datetimeFigureOut">
               <a:rPr lang="en-GB" smtClean="0"/>
-              <a:t>02/02/2022</a:t>
+              <a:t>26/03/2022</a:t>
             </a:fld>
             <a:endParaRPr lang="en-GB"/>
           </a:p>
@@ -3086,7 +3446,7 @@
           <a:p>
             <a:fld id="{7FE43369-170B-4886-A028-E14877BC39B1}" type="datetimeFigureOut">
               <a:rPr lang="en-GB" smtClean="0"/>
-              <a:t>02/02/2022</a:t>
+              <a:t>26/03/2022</a:t>
             </a:fld>
             <a:endParaRPr lang="en-GB"/>
           </a:p>
@@ -3299,7 +3659,7 @@
           <a:p>
             <a:fld id="{7FE43369-170B-4886-A028-E14877BC39B1}" type="datetimeFigureOut">
               <a:rPr lang="en-GB" smtClean="0"/>
-              <a:t>02/02/2022</a:t>
+              <a:t>26/03/2022</a:t>
             </a:fld>
             <a:endParaRPr lang="en-GB"/>
           </a:p>
@@ -3704,135 +4064,12 @@
           <a:chExt cx="0" cy="0"/>
         </a:xfrm>
       </p:grpSpPr>
-      <p:sp>
-        <p:nvSpPr>
-          <p:cNvPr id="27" name="TextBox 26">
+      <p:cxnSp>
+        <p:nvCxnSpPr>
+          <p:cNvPr id="24" name="Straight Connector 23">
             <a:extLst>
               <a:ext uri="{FF2B5EF4-FFF2-40B4-BE49-F238E27FC236}">
-                <a16:creationId xmlns:a16="http://schemas.microsoft.com/office/drawing/2014/main" id="{00E90DE2-659E-4F92-9C90-618438314250}"/>
-              </a:ext>
-            </a:extLst>
-          </p:cNvPr>
-          <p:cNvSpPr txBox="1"/>
-          <p:nvPr/>
-        </p:nvSpPr>
-        <p:spPr>
-          <a:xfrm rot="16200000">
-            <a:off x="-212279" y="2926364"/>
-            <a:ext cx="1131127" cy="338554"/>
-          </a:xfrm>
-          <a:prstGeom prst="rect">
-            <a:avLst/>
-          </a:prstGeom>
-          <a:noFill/>
-        </p:spPr>
-        <p:txBody>
-          <a:bodyPr wrap="square" rtlCol="0">
-            <a:spAutoFit/>
-          </a:bodyPr>
-          <a:lstStyle/>
-          <a:p>
-            <a:pPr algn="r"/>
-            <a:r>
-              <a:rPr lang="en-GB" sz="800" dirty="0">
-                <a:solidFill>
-                  <a:srgbClr val="00B050"/>
-                </a:solidFill>
-              </a:rPr>
-              <a:t>0000 – 1200 UTC</a:t>
-            </a:r>
-          </a:p>
-          <a:p>
-            <a:pPr algn="r"/>
-            <a:r>
-              <a:rPr lang="en-GB" sz="800" dirty="0">
-                <a:solidFill>
-                  <a:srgbClr val="00B050"/>
-                </a:solidFill>
-              </a:rPr>
-              <a:t>(1800 – 0600 LST)</a:t>
-            </a:r>
-          </a:p>
-        </p:txBody>
-      </p:sp>
-      <p:sp>
-        <p:nvSpPr>
-          <p:cNvPr id="28" name="TextBox 27">
-            <a:extLst>
-              <a:ext uri="{FF2B5EF4-FFF2-40B4-BE49-F238E27FC236}">
-                <a16:creationId xmlns:a16="http://schemas.microsoft.com/office/drawing/2014/main" id="{F1F1CEF0-33DD-427A-B476-81848BB2EE82}"/>
-              </a:ext>
-            </a:extLst>
-          </p:cNvPr>
-          <p:cNvSpPr txBox="1"/>
-          <p:nvPr/>
-        </p:nvSpPr>
-        <p:spPr>
-          <a:xfrm>
-            <a:off x="-456" y="3342087"/>
-            <a:ext cx="3186113" cy="215444"/>
-          </a:xfrm>
-          <a:prstGeom prst="rect">
-            <a:avLst/>
-          </a:prstGeom>
-          <a:noFill/>
-        </p:spPr>
-        <p:txBody>
-          <a:bodyPr wrap="square" rtlCol="0">
-            <a:spAutoFit/>
-          </a:bodyPr>
-          <a:lstStyle/>
-          <a:p>
-            <a:pPr algn="ctr"/>
-            <a:r>
-              <a:rPr lang="en-GB" sz="800" dirty="0"/>
-              <a:t>Final step of 12-hourly accumulation periods (in hours) for 00 UTC runs</a:t>
-            </a:r>
-          </a:p>
-        </p:txBody>
-      </p:sp>
-      <p:sp>
-        <p:nvSpPr>
-          <p:cNvPr id="29" name="TextBox 28">
-            <a:extLst>
-              <a:ext uri="{FF2B5EF4-FFF2-40B4-BE49-F238E27FC236}">
-                <a16:creationId xmlns:a16="http://schemas.microsoft.com/office/drawing/2014/main" id="{DE58D980-EFAB-43A2-AC72-FDB72280FDEE}"/>
-              </a:ext>
-            </a:extLst>
-          </p:cNvPr>
-          <p:cNvSpPr txBox="1"/>
-          <p:nvPr/>
-        </p:nvSpPr>
-        <p:spPr>
-          <a:xfrm>
-            <a:off x="-78024" y="360466"/>
-            <a:ext cx="307777" cy="2144609"/>
-          </a:xfrm>
-          <a:prstGeom prst="rect">
-            <a:avLst/>
-          </a:prstGeom>
-          <a:noFill/>
-        </p:spPr>
-        <p:txBody>
-          <a:bodyPr vert="vert270" wrap="square" rtlCol="0">
-            <a:spAutoFit/>
-          </a:bodyPr>
-          <a:lstStyle/>
-          <a:p>
-            <a:pPr algn="ctr"/>
-            <a:r>
-              <a:rPr lang="en-GB" sz="800" dirty="0"/>
-              <a:t>Rainfall, Annual mean (mm/12h)</a:t>
-            </a:r>
-          </a:p>
-        </p:txBody>
-      </p:sp>
-      <p:cxnSp>
-        <p:nvCxnSpPr>
-          <p:cNvPr id="30" name="Straight Connector 29">
-            <a:extLst>
-              <a:ext uri="{FF2B5EF4-FFF2-40B4-BE49-F238E27FC236}">
-                <a16:creationId xmlns:a16="http://schemas.microsoft.com/office/drawing/2014/main" id="{D31BE9AF-EC05-4759-8FF8-FD7419E0A2C5}"/>
+                <a16:creationId xmlns:a16="http://schemas.microsoft.com/office/drawing/2014/main" id="{0578D5BA-0A89-4DB9-BBA2-233C5FAC86B6}"/>
               </a:ext>
             </a:extLst>
           </p:cNvPr>
@@ -3843,7 +4080,7 @@
         </p:nvCxnSpPr>
         <p:spPr>
           <a:xfrm>
-            <a:off x="755302" y="93701"/>
+            <a:off x="779699" y="94533"/>
             <a:ext cx="540000" cy="0"/>
           </a:xfrm>
           <a:prstGeom prst="line">
@@ -3872,10 +4109,10 @@
       </p:cxnSp>
       <p:sp>
         <p:nvSpPr>
-          <p:cNvPr id="31" name="TextBox 30">
+          <p:cNvPr id="25" name="TextBox 24">
             <a:extLst>
               <a:ext uri="{FF2B5EF4-FFF2-40B4-BE49-F238E27FC236}">
-                <a16:creationId xmlns:a16="http://schemas.microsoft.com/office/drawing/2014/main" id="{478D9331-26E4-43AB-B76E-285227A963C3}"/>
+                <a16:creationId xmlns:a16="http://schemas.microsoft.com/office/drawing/2014/main" id="{3272CF81-793D-457C-857B-B598383B4BC9}"/>
               </a:ext>
             </a:extLst>
           </p:cNvPr>
@@ -3884,7 +4121,7 @@
         </p:nvSpPr>
         <p:spPr>
           <a:xfrm>
-            <a:off x="1313819" y="-29407"/>
+            <a:off x="1338216" y="-28575"/>
             <a:ext cx="786365" cy="215444"/>
           </a:xfrm>
           <a:prstGeom prst="rect">
@@ -3907,10 +4144,10 @@
       </p:sp>
       <p:cxnSp>
         <p:nvCxnSpPr>
-          <p:cNvPr id="32" name="Straight Connector 31">
+          <p:cNvPr id="26" name="Straight Connector 25">
             <a:extLst>
               <a:ext uri="{FF2B5EF4-FFF2-40B4-BE49-F238E27FC236}">
-                <a16:creationId xmlns:a16="http://schemas.microsoft.com/office/drawing/2014/main" id="{7AC14612-FAF7-4F29-933D-EFD575EA6101}"/>
+                <a16:creationId xmlns:a16="http://schemas.microsoft.com/office/drawing/2014/main" id="{A26E6068-3F47-4E14-B2F3-2743B53556B6}"/>
               </a:ext>
             </a:extLst>
           </p:cNvPr>
@@ -3921,7 +4158,7 @@
         </p:nvCxnSpPr>
         <p:spPr>
           <a:xfrm>
-            <a:off x="755302" y="267474"/>
+            <a:off x="779699" y="268306"/>
             <a:ext cx="540000" cy="0"/>
           </a:xfrm>
           <a:prstGeom prst="line">
@@ -3951,10 +4188,10 @@
       </p:cxnSp>
       <p:sp>
         <p:nvSpPr>
-          <p:cNvPr id="33" name="TextBox 32">
+          <p:cNvPr id="47" name="TextBox 46">
             <a:extLst>
               <a:ext uri="{FF2B5EF4-FFF2-40B4-BE49-F238E27FC236}">
-                <a16:creationId xmlns:a16="http://schemas.microsoft.com/office/drawing/2014/main" id="{CD6626ED-DC46-4605-86E0-6B77ABB5F91B}"/>
+                <a16:creationId xmlns:a16="http://schemas.microsoft.com/office/drawing/2014/main" id="{C85108AB-6CF6-4C6D-A3AC-6F3EC134786B}"/>
               </a:ext>
             </a:extLst>
           </p:cNvPr>
@@ -3963,7 +4200,7 @@
         </p:nvSpPr>
         <p:spPr>
           <a:xfrm>
-            <a:off x="1313819" y="144365"/>
+            <a:off x="1338216" y="145197"/>
             <a:ext cx="819233" cy="215444"/>
           </a:xfrm>
           <a:prstGeom prst="rect">
@@ -3986,10 +4223,10 @@
       </p:sp>
       <p:cxnSp>
         <p:nvCxnSpPr>
-          <p:cNvPr id="34" name="Straight Connector 33">
+          <p:cNvPr id="48" name="Straight Connector 47">
             <a:extLst>
               <a:ext uri="{FF2B5EF4-FFF2-40B4-BE49-F238E27FC236}">
-                <a16:creationId xmlns:a16="http://schemas.microsoft.com/office/drawing/2014/main" id="{505CC9D4-4513-4FD2-987F-15BE397F07E0}"/>
+                <a16:creationId xmlns:a16="http://schemas.microsoft.com/office/drawing/2014/main" id="{06256763-C418-476A-9A63-2233E52816EB}"/>
               </a:ext>
             </a:extLst>
           </p:cNvPr>
@@ -4000,7 +4237,7 @@
         </p:nvCxnSpPr>
         <p:spPr>
           <a:xfrm>
-            <a:off x="2176857" y="116461"/>
+            <a:off x="2096479" y="117293"/>
             <a:ext cx="72000" cy="0"/>
           </a:xfrm>
           <a:prstGeom prst="line">
@@ -4029,10 +4266,10 @@
       </p:cxnSp>
       <p:sp>
         <p:nvSpPr>
-          <p:cNvPr id="35" name="TextBox 34">
+          <p:cNvPr id="49" name="TextBox 48">
             <a:extLst>
               <a:ext uri="{FF2B5EF4-FFF2-40B4-BE49-F238E27FC236}">
-                <a16:creationId xmlns:a16="http://schemas.microsoft.com/office/drawing/2014/main" id="{878FF700-3069-4BFA-83D9-B5C8E51EB129}"/>
+                <a16:creationId xmlns:a16="http://schemas.microsoft.com/office/drawing/2014/main" id="{E20D998A-1B2F-4F92-A28D-99370057CAAA}"/>
               </a:ext>
             </a:extLst>
           </p:cNvPr>
@@ -4041,7 +4278,7 @@
         </p:nvSpPr>
         <p:spPr>
           <a:xfrm>
-            <a:off x="2212857" y="-6649"/>
+            <a:off x="2132479" y="-5817"/>
             <a:ext cx="617143" cy="215444"/>
           </a:xfrm>
           <a:prstGeom prst="rect">
@@ -4064,10 +4301,10 @@
       </p:sp>
       <p:cxnSp>
         <p:nvCxnSpPr>
-          <p:cNvPr id="36" name="Straight Connector 35">
+          <p:cNvPr id="50" name="Straight Connector 49">
             <a:extLst>
               <a:ext uri="{FF2B5EF4-FFF2-40B4-BE49-F238E27FC236}">
-                <a16:creationId xmlns:a16="http://schemas.microsoft.com/office/drawing/2014/main" id="{790E7FE7-7144-4DF6-A6E4-757C6B8E9C2C}"/>
+                <a16:creationId xmlns:a16="http://schemas.microsoft.com/office/drawing/2014/main" id="{2E15FE6C-AE66-44B9-B85F-0CDB63AD046B}"/>
               </a:ext>
             </a:extLst>
           </p:cNvPr>
@@ -4078,7 +4315,7 @@
         </p:nvCxnSpPr>
         <p:spPr>
           <a:xfrm>
-            <a:off x="2183935" y="264069"/>
+            <a:off x="2103557" y="264901"/>
             <a:ext cx="72000" cy="0"/>
           </a:xfrm>
           <a:prstGeom prst="line">
@@ -4107,10 +4344,10 @@
       </p:cxnSp>
       <p:sp>
         <p:nvSpPr>
-          <p:cNvPr id="37" name="TextBox 36">
+          <p:cNvPr id="51" name="TextBox 50">
             <a:extLst>
               <a:ext uri="{FF2B5EF4-FFF2-40B4-BE49-F238E27FC236}">
-                <a16:creationId xmlns:a16="http://schemas.microsoft.com/office/drawing/2014/main" id="{C95FDC63-B13B-4446-ADA0-0A0C450337CF}"/>
+                <a16:creationId xmlns:a16="http://schemas.microsoft.com/office/drawing/2014/main" id="{40E422A4-4BE9-4B0B-8B34-FE4650B0A6C4}"/>
               </a:ext>
             </a:extLst>
           </p:cNvPr>
@@ -4119,7 +4356,7 @@
         </p:nvSpPr>
         <p:spPr>
           <a:xfrm>
-            <a:off x="2219935" y="140959"/>
+            <a:off x="2139557" y="141791"/>
             <a:ext cx="617143" cy="215444"/>
           </a:xfrm>
           <a:prstGeom prst="rect">
@@ -4140,318 +4377,12 @@
           </a:p>
         </p:txBody>
       </p:sp>
-      <p:sp>
-        <p:nvSpPr>
-          <p:cNvPr id="38" name="TextBox 37">
+      <p:pic>
+        <p:nvPicPr>
+          <p:cNvPr id="58" name="Graphic 57">
             <a:extLst>
               <a:ext uri="{FF2B5EF4-FFF2-40B4-BE49-F238E27FC236}">
-                <a16:creationId xmlns:a16="http://schemas.microsoft.com/office/drawing/2014/main" id="{E10024AC-8D9A-432C-AB61-575E9BBB09D0}"/>
-              </a:ext>
-            </a:extLst>
-          </p:cNvPr>
-          <p:cNvSpPr txBox="1"/>
-          <p:nvPr/>
-        </p:nvSpPr>
-        <p:spPr>
-          <a:xfrm rot="16200000">
-            <a:off x="120605" y="2926361"/>
-            <a:ext cx="1131127" cy="338554"/>
-          </a:xfrm>
-          <a:prstGeom prst="rect">
-            <a:avLst/>
-          </a:prstGeom>
-          <a:noFill/>
-        </p:spPr>
-        <p:txBody>
-          <a:bodyPr wrap="square" rtlCol="0">
-            <a:spAutoFit/>
-          </a:bodyPr>
-          <a:lstStyle/>
-          <a:p>
-            <a:pPr algn="r"/>
-            <a:r>
-              <a:rPr lang="en-GB" sz="800" dirty="0">
-                <a:solidFill>
-                  <a:srgbClr val="7030A0"/>
-                </a:solidFill>
-              </a:rPr>
-              <a:t>0600 – 1800 UTC</a:t>
-            </a:r>
-          </a:p>
-          <a:p>
-            <a:pPr algn="r"/>
-            <a:r>
-              <a:rPr lang="en-GB" sz="800" dirty="0">
-                <a:solidFill>
-                  <a:srgbClr val="7030A0"/>
-                </a:solidFill>
-              </a:rPr>
-              <a:t>(0000 – 1200 LST)</a:t>
-            </a:r>
-          </a:p>
-        </p:txBody>
-      </p:sp>
-      <p:sp>
-        <p:nvSpPr>
-          <p:cNvPr id="39" name="TextBox 38">
-            <a:extLst>
-              <a:ext uri="{FF2B5EF4-FFF2-40B4-BE49-F238E27FC236}">
-                <a16:creationId xmlns:a16="http://schemas.microsoft.com/office/drawing/2014/main" id="{01324B42-26A5-4007-975F-2916ECF3FF0A}"/>
-              </a:ext>
-            </a:extLst>
-          </p:cNvPr>
-          <p:cNvSpPr txBox="1"/>
-          <p:nvPr/>
-        </p:nvSpPr>
-        <p:spPr>
-          <a:xfrm rot="16200000">
-            <a:off x="453492" y="2926361"/>
-            <a:ext cx="1131127" cy="338554"/>
-          </a:xfrm>
-          <a:prstGeom prst="rect">
-            <a:avLst/>
-          </a:prstGeom>
-          <a:noFill/>
-        </p:spPr>
-        <p:txBody>
-          <a:bodyPr wrap="square" rtlCol="0">
-            <a:spAutoFit/>
-          </a:bodyPr>
-          <a:lstStyle/>
-          <a:p>
-            <a:pPr algn="r"/>
-            <a:r>
-              <a:rPr lang="en-GB" sz="800" dirty="0">
-                <a:solidFill>
-                  <a:srgbClr val="00B0F0"/>
-                </a:solidFill>
-              </a:rPr>
-              <a:t>1200 – 0000 UTC</a:t>
-            </a:r>
-          </a:p>
-          <a:p>
-            <a:pPr algn="r"/>
-            <a:r>
-              <a:rPr lang="en-GB" sz="800" dirty="0">
-                <a:solidFill>
-                  <a:srgbClr val="00B0F0"/>
-                </a:solidFill>
-              </a:rPr>
-              <a:t>(0600 – 1800 LST)</a:t>
-            </a:r>
-          </a:p>
-        </p:txBody>
-      </p:sp>
-      <p:sp>
-        <p:nvSpPr>
-          <p:cNvPr id="40" name="TextBox 39">
-            <a:extLst>
-              <a:ext uri="{FF2B5EF4-FFF2-40B4-BE49-F238E27FC236}">
-                <a16:creationId xmlns:a16="http://schemas.microsoft.com/office/drawing/2014/main" id="{31868FCF-D502-4785-80D7-584AC15DB2AA}"/>
-              </a:ext>
-            </a:extLst>
-          </p:cNvPr>
-          <p:cNvSpPr txBox="1"/>
-          <p:nvPr/>
-        </p:nvSpPr>
-        <p:spPr>
-          <a:xfrm rot="16200000">
-            <a:off x="786379" y="2926361"/>
-            <a:ext cx="1131127" cy="338554"/>
-          </a:xfrm>
-          <a:prstGeom prst="rect">
-            <a:avLst/>
-          </a:prstGeom>
-          <a:noFill/>
-        </p:spPr>
-        <p:txBody>
-          <a:bodyPr wrap="square" rtlCol="0">
-            <a:spAutoFit/>
-          </a:bodyPr>
-          <a:lstStyle/>
-          <a:p>
-            <a:pPr algn="r"/>
-            <a:r>
-              <a:rPr lang="en-GB" sz="800" dirty="0">
-                <a:solidFill>
-                  <a:srgbClr val="FF3838"/>
-                </a:solidFill>
-              </a:rPr>
-              <a:t>1800 – 0600 UTC</a:t>
-            </a:r>
-          </a:p>
-          <a:p>
-            <a:pPr algn="r"/>
-            <a:r>
-              <a:rPr lang="en-GB" sz="800" dirty="0">
-                <a:solidFill>
-                  <a:srgbClr val="FF3838"/>
-                </a:solidFill>
-              </a:rPr>
-              <a:t>(1200 – 0000 LST)</a:t>
-            </a:r>
-          </a:p>
-        </p:txBody>
-      </p:sp>
-      <p:sp>
-        <p:nvSpPr>
-          <p:cNvPr id="41" name="TextBox 40">
-            <a:extLst>
-              <a:ext uri="{FF2B5EF4-FFF2-40B4-BE49-F238E27FC236}">
-                <a16:creationId xmlns:a16="http://schemas.microsoft.com/office/drawing/2014/main" id="{71934EAA-02AC-476A-BFD2-65E9D9663E87}"/>
-              </a:ext>
-            </a:extLst>
-          </p:cNvPr>
-          <p:cNvSpPr txBox="1"/>
-          <p:nvPr/>
-        </p:nvSpPr>
-        <p:spPr>
-          <a:xfrm rot="16200000">
-            <a:off x="1119266" y="2926361"/>
-            <a:ext cx="1131127" cy="338554"/>
-          </a:xfrm>
-          <a:prstGeom prst="rect">
-            <a:avLst/>
-          </a:prstGeom>
-          <a:noFill/>
-        </p:spPr>
-        <p:txBody>
-          <a:bodyPr wrap="square" rtlCol="0">
-            <a:spAutoFit/>
-          </a:bodyPr>
-          <a:lstStyle/>
-          <a:p>
-            <a:pPr algn="r"/>
-            <a:r>
-              <a:rPr lang="en-GB" sz="800" dirty="0">
-                <a:solidFill>
-                  <a:srgbClr val="00B050"/>
-                </a:solidFill>
-              </a:rPr>
-              <a:t>0000 – 1200 UTC</a:t>
-            </a:r>
-          </a:p>
-          <a:p>
-            <a:pPr algn="r"/>
-            <a:r>
-              <a:rPr lang="en-GB" sz="800" dirty="0">
-                <a:solidFill>
-                  <a:srgbClr val="00B050"/>
-                </a:solidFill>
-              </a:rPr>
-              <a:t>(1800 – 0600 LST)</a:t>
-            </a:r>
-          </a:p>
-        </p:txBody>
-      </p:sp>
-      <p:sp>
-        <p:nvSpPr>
-          <p:cNvPr id="42" name="TextBox 41">
-            <a:extLst>
-              <a:ext uri="{FF2B5EF4-FFF2-40B4-BE49-F238E27FC236}">
-                <a16:creationId xmlns:a16="http://schemas.microsoft.com/office/drawing/2014/main" id="{88B28942-5A71-4B06-919D-6366AAD65DBF}"/>
-              </a:ext>
-            </a:extLst>
-          </p:cNvPr>
-          <p:cNvSpPr txBox="1"/>
-          <p:nvPr/>
-        </p:nvSpPr>
-        <p:spPr>
-          <a:xfrm rot="16200000">
-            <a:off x="1452153" y="2926361"/>
-            <a:ext cx="1131127" cy="338554"/>
-          </a:xfrm>
-          <a:prstGeom prst="rect">
-            <a:avLst/>
-          </a:prstGeom>
-          <a:noFill/>
-        </p:spPr>
-        <p:txBody>
-          <a:bodyPr wrap="square" rtlCol="0">
-            <a:spAutoFit/>
-          </a:bodyPr>
-          <a:lstStyle/>
-          <a:p>
-            <a:pPr algn="r"/>
-            <a:r>
-              <a:rPr lang="en-GB" sz="800" dirty="0">
-                <a:solidFill>
-                  <a:srgbClr val="7030A0"/>
-                </a:solidFill>
-              </a:rPr>
-              <a:t>0600 – 1800 UTC</a:t>
-            </a:r>
-          </a:p>
-          <a:p>
-            <a:pPr algn="r"/>
-            <a:r>
-              <a:rPr lang="en-GB" sz="800" dirty="0">
-                <a:solidFill>
-                  <a:srgbClr val="7030A0"/>
-                </a:solidFill>
-              </a:rPr>
-              <a:t>(0000 – 1200 LST)</a:t>
-            </a:r>
-          </a:p>
-        </p:txBody>
-      </p:sp>
-      <p:sp>
-        <p:nvSpPr>
-          <p:cNvPr id="43" name="TextBox 42">
-            <a:extLst>
-              <a:ext uri="{FF2B5EF4-FFF2-40B4-BE49-F238E27FC236}">
-                <a16:creationId xmlns:a16="http://schemas.microsoft.com/office/drawing/2014/main" id="{DF9768C6-1EA7-48E4-A7C4-D530232761D7}"/>
-              </a:ext>
-            </a:extLst>
-          </p:cNvPr>
-          <p:cNvSpPr txBox="1"/>
-          <p:nvPr/>
-        </p:nvSpPr>
-        <p:spPr>
-          <a:xfrm rot="16200000">
-            <a:off x="1785040" y="2926361"/>
-            <a:ext cx="1131127" cy="338554"/>
-          </a:xfrm>
-          <a:prstGeom prst="rect">
-            <a:avLst/>
-          </a:prstGeom>
-          <a:noFill/>
-        </p:spPr>
-        <p:txBody>
-          <a:bodyPr wrap="square" rtlCol="0">
-            <a:spAutoFit/>
-          </a:bodyPr>
-          <a:lstStyle/>
-          <a:p>
-            <a:pPr algn="r"/>
-            <a:r>
-              <a:rPr lang="en-GB" sz="800" dirty="0">
-                <a:solidFill>
-                  <a:srgbClr val="00B0F0"/>
-                </a:solidFill>
-              </a:rPr>
-              <a:t>1200 – 0000 UTC</a:t>
-            </a:r>
-          </a:p>
-          <a:p>
-            <a:pPr algn="r"/>
-            <a:r>
-              <a:rPr lang="en-GB" sz="800" dirty="0">
-                <a:solidFill>
-                  <a:srgbClr val="00B0F0"/>
-                </a:solidFill>
-              </a:rPr>
-              <a:t>(0600 – 1800 LST)</a:t>
-            </a:r>
-          </a:p>
-        </p:txBody>
-      </p:sp>
-      <p:pic>
-        <p:nvPicPr>
-          <p:cNvPr id="44" name="Graphic 43">
-            <a:extLst>
-              <a:ext uri="{FF2B5EF4-FFF2-40B4-BE49-F238E27FC236}">
-                <a16:creationId xmlns:a16="http://schemas.microsoft.com/office/drawing/2014/main" id="{226AFAD0-6AB0-4B3E-B482-8A6241F481C0}"/>
+                <a16:creationId xmlns:a16="http://schemas.microsoft.com/office/drawing/2014/main" id="{19811510-0C66-40C0-852A-7514EF809751}"/>
               </a:ext>
             </a:extLst>
           </p:cNvPr>
@@ -4460,7 +4391,7 @@
           </p:cNvPicPr>
           <p:nvPr/>
         </p:nvPicPr>
-        <p:blipFill>
+        <p:blipFill rotWithShape="1">
           <a:blip r:embed="rId2">
             <a:extLst>
               <a:ext uri="{28A0092B-C50C-407E-A947-70E740481C1C}">
@@ -4471,14 +4402,13 @@
               </a:ext>
             </a:extLst>
           </a:blip>
-          <a:stretch>
-            <a:fillRect/>
-          </a:stretch>
+          <a:srcRect t="-2777" b="-2"/>
+          <a:stretch/>
         </p:blipFill>
         <p:spPr>
           <a:xfrm>
-            <a:off x="185809" y="330029"/>
-            <a:ext cx="2880000" cy="2259787"/>
+            <a:off x="210206" y="287166"/>
+            <a:ext cx="2880000" cy="2322533"/>
           </a:xfrm>
           <a:prstGeom prst="rect">
             <a:avLst/>
@@ -4487,10 +4417,10 @@
       </p:pic>
       <p:sp>
         <p:nvSpPr>
-          <p:cNvPr id="45" name="TextBox 44">
+          <p:cNvPr id="61" name="TextBox 60">
             <a:extLst>
               <a:ext uri="{FF2B5EF4-FFF2-40B4-BE49-F238E27FC236}">
-                <a16:creationId xmlns:a16="http://schemas.microsoft.com/office/drawing/2014/main" id="{CB7AB357-4408-4D9B-8FF9-07DB9C1357E2}"/>
+                <a16:creationId xmlns:a16="http://schemas.microsoft.com/office/drawing/2014/main" id="{D1D7AC64-C873-4FE5-944B-9F8061EAC0E3}"/>
               </a:ext>
             </a:extLst>
           </p:cNvPr>
@@ -4498,8 +4428,186 @@
           <p:nvPr/>
         </p:nvSpPr>
         <p:spPr>
+          <a:xfrm>
+            <a:off x="-54006" y="372370"/>
+            <a:ext cx="307777" cy="2144609"/>
+          </a:xfrm>
+          <a:prstGeom prst="rect">
+            <a:avLst/>
+          </a:prstGeom>
+          <a:noFill/>
+        </p:spPr>
+        <p:txBody>
+          <a:bodyPr vert="vert270" wrap="square" rtlCol="0">
+            <a:spAutoFit/>
+          </a:bodyPr>
+          <a:lstStyle/>
+          <a:p>
+            <a:pPr algn="ctr"/>
+            <a:r>
+              <a:rPr lang="en-GB" sz="800" dirty="0"/>
+              <a:t>Rainfall, Annual mean (mm/12h)</a:t>
+            </a:r>
+          </a:p>
+        </p:txBody>
+      </p:sp>
+      <p:sp>
+        <p:nvSpPr>
+          <p:cNvPr id="3" name="Rectangle 2">
+            <a:extLst>
+              <a:ext uri="{FF2B5EF4-FFF2-40B4-BE49-F238E27FC236}">
+                <a16:creationId xmlns:a16="http://schemas.microsoft.com/office/drawing/2014/main" id="{81A79DA1-CA5D-4B48-8117-C239F2D36BAC}"/>
+              </a:ext>
+            </a:extLst>
+          </p:cNvPr>
+          <p:cNvSpPr/>
+          <p:nvPr/>
+        </p:nvSpPr>
+        <p:spPr>
+          <a:xfrm>
+            <a:off x="163264" y="2375070"/>
+            <a:ext cx="180975" cy="161925"/>
+          </a:xfrm>
+          <a:prstGeom prst="rect">
+            <a:avLst/>
+          </a:prstGeom>
+          <a:solidFill>
+            <a:schemeClr val="bg1"/>
+          </a:solidFill>
+          <a:ln>
+            <a:noFill/>
+          </a:ln>
+        </p:spPr>
+        <p:style>
+          <a:lnRef idx="2">
+            <a:schemeClr val="accent1">
+              <a:shade val="50000"/>
+            </a:schemeClr>
+          </a:lnRef>
+          <a:fillRef idx="1">
+            <a:schemeClr val="accent1"/>
+          </a:fillRef>
+          <a:effectRef idx="0">
+            <a:schemeClr val="accent1"/>
+          </a:effectRef>
+          <a:fontRef idx="minor">
+            <a:schemeClr val="lt1"/>
+          </a:fontRef>
+        </p:style>
+        <p:txBody>
+          <a:bodyPr rtlCol="0" anchor="ctr"/>
+          <a:lstStyle/>
+          <a:p>
+            <a:pPr algn="ctr"/>
+            <a:endParaRPr lang="en-GB"/>
+          </a:p>
+        </p:txBody>
+      </p:sp>
+      <p:sp>
+        <p:nvSpPr>
+          <p:cNvPr id="4" name="Rectangle 3">
+            <a:extLst>
+              <a:ext uri="{FF2B5EF4-FFF2-40B4-BE49-F238E27FC236}">
+                <a16:creationId xmlns:a16="http://schemas.microsoft.com/office/drawing/2014/main" id="{8BD3E922-5972-4E51-86D8-A5354F849C2D}"/>
+              </a:ext>
+            </a:extLst>
+          </p:cNvPr>
+          <p:cNvSpPr/>
+          <p:nvPr/>
+        </p:nvSpPr>
+        <p:spPr>
+          <a:xfrm>
+            <a:off x="95906" y="2502331"/>
+            <a:ext cx="3039919" cy="301884"/>
+          </a:xfrm>
+          <a:prstGeom prst="rect">
+            <a:avLst/>
+          </a:prstGeom>
+          <a:solidFill>
+            <a:schemeClr val="bg1"/>
+          </a:solidFill>
+          <a:ln>
+            <a:solidFill>
+              <a:schemeClr val="bg1"/>
+            </a:solidFill>
+          </a:ln>
+        </p:spPr>
+        <p:style>
+          <a:lnRef idx="2">
+            <a:schemeClr val="accent1">
+              <a:shade val="50000"/>
+            </a:schemeClr>
+          </a:lnRef>
+          <a:fillRef idx="1">
+            <a:schemeClr val="accent1"/>
+          </a:fillRef>
+          <a:effectRef idx="0">
+            <a:schemeClr val="accent1"/>
+          </a:effectRef>
+          <a:fontRef idx="minor">
+            <a:schemeClr val="lt1"/>
+          </a:fontRef>
+        </p:style>
+        <p:txBody>
+          <a:bodyPr rtlCol="0" anchor="ctr"/>
+          <a:lstStyle/>
+          <a:p>
+            <a:pPr algn="ctr"/>
+            <a:endParaRPr lang="en-GB"/>
+          </a:p>
+        </p:txBody>
+      </p:sp>
+      <p:sp>
+        <p:nvSpPr>
+          <p:cNvPr id="2" name="TextBox 1">
+            <a:extLst>
+              <a:ext uri="{FF2B5EF4-FFF2-40B4-BE49-F238E27FC236}">
+                <a16:creationId xmlns:a16="http://schemas.microsoft.com/office/drawing/2014/main" id="{8D806A4D-7727-4354-AADB-5B6FE5BFA807}"/>
+              </a:ext>
+            </a:extLst>
+          </p:cNvPr>
+          <p:cNvSpPr txBox="1"/>
+          <p:nvPr/>
+        </p:nvSpPr>
+        <p:spPr>
+          <a:xfrm>
+            <a:off x="50288" y="2344887"/>
+            <a:ext cx="374783" cy="215444"/>
+          </a:xfrm>
+          <a:prstGeom prst="rect">
+            <a:avLst/>
+          </a:prstGeom>
+          <a:noFill/>
+        </p:spPr>
+        <p:txBody>
+          <a:bodyPr wrap="square" rtlCol="0">
+            <a:spAutoFit/>
+          </a:bodyPr>
+          <a:lstStyle/>
+          <a:p>
+            <a:pPr algn="r"/>
+            <a:r>
+              <a:rPr lang="en-GB" sz="780" dirty="0"/>
+              <a:t>1.5</a:t>
+            </a:r>
+          </a:p>
+        </p:txBody>
+      </p:sp>
+      <p:sp>
+        <p:nvSpPr>
+          <p:cNvPr id="22" name="TextBox 21">
+            <a:extLst>
+              <a:ext uri="{FF2B5EF4-FFF2-40B4-BE49-F238E27FC236}">
+                <a16:creationId xmlns:a16="http://schemas.microsoft.com/office/drawing/2014/main" id="{9C7BE802-90A6-449E-80E0-3BD9D47057C3}"/>
+              </a:ext>
+            </a:extLst>
+          </p:cNvPr>
+          <p:cNvSpPr txBox="1"/>
+          <p:nvPr/>
+        </p:nvSpPr>
+        <p:spPr>
           <a:xfrm rot="16200000">
-            <a:off x="2117927" y="2926361"/>
+            <a:off x="-187882" y="2841471"/>
             <a:ext cx="1131127" cy="338554"/>
           </a:xfrm>
           <a:prstGeom prst="rect">
@@ -4517,10 +4625,10 @@
             <a:r>
               <a:rPr lang="en-GB" sz="800" dirty="0">
                 <a:solidFill>
-                  <a:srgbClr val="FF3838"/>
+                  <a:srgbClr val="00B050"/>
                 </a:solidFill>
               </a:rPr>
-              <a:t>1800 – 0600 UTC</a:t>
+              <a:t>0000 – 1200 UTC</a:t>
             </a:r>
           </a:p>
           <a:p>
@@ -4528,20 +4636,20 @@
             <a:r>
               <a:rPr lang="en-GB" sz="800" dirty="0">
                 <a:solidFill>
-                  <a:srgbClr val="FF3838"/>
+                  <a:srgbClr val="00B050"/>
                 </a:solidFill>
               </a:rPr>
-              <a:t>(1200 – 0000 LST)</a:t>
-            </a:r>
-          </a:p>
-        </p:txBody>
-      </p:sp>
-      <p:sp>
-        <p:nvSpPr>
-          <p:cNvPr id="46" name="TextBox 45">
+              <a:t>(1800 – 0600 LT)</a:t>
+            </a:r>
+          </a:p>
+        </p:txBody>
+      </p:sp>
+      <p:sp>
+        <p:nvSpPr>
+          <p:cNvPr id="52" name="TextBox 51">
             <a:extLst>
               <a:ext uri="{FF2B5EF4-FFF2-40B4-BE49-F238E27FC236}">
-                <a16:creationId xmlns:a16="http://schemas.microsoft.com/office/drawing/2014/main" id="{30417234-39C3-4EEF-BF2C-1D2D1C5781BA}"/>
+                <a16:creationId xmlns:a16="http://schemas.microsoft.com/office/drawing/2014/main" id="{E5A65E4B-9E1F-4B4F-90B0-8E88F6496F7A}"/>
               </a:ext>
             </a:extLst>
           </p:cNvPr>
@@ -4550,7 +4658,7 @@
         </p:nvSpPr>
         <p:spPr>
           <a:xfrm rot="16200000">
-            <a:off x="2450816" y="2926361"/>
+            <a:off x="145002" y="2841468"/>
             <a:ext cx="1131127" cy="338554"/>
           </a:xfrm>
           <a:prstGeom prst="rect">
@@ -4568,12 +4676,154 @@
             <a:r>
               <a:rPr lang="en-GB" sz="800" dirty="0">
                 <a:solidFill>
-                  <a:srgbClr val="00B050"/>
+                  <a:srgbClr val="7030A0"/>
                 </a:solidFill>
               </a:rPr>
-              <a:t>0000 – 1200 UTC</a:t>
-            </a:r>
-          </a:p>
+              <a:t>0600 – 1800 UTC</a:t>
+            </a:r>
+          </a:p>
+          <a:p>
+            <a:pPr algn="r"/>
+            <a:r>
+              <a:rPr lang="en-GB" sz="800" dirty="0">
+                <a:solidFill>
+                  <a:srgbClr val="7030A0"/>
+                </a:solidFill>
+              </a:rPr>
+              <a:t>(0000 – 1200 LT)</a:t>
+            </a:r>
+          </a:p>
+        </p:txBody>
+      </p:sp>
+      <p:sp>
+        <p:nvSpPr>
+          <p:cNvPr id="53" name="TextBox 52">
+            <a:extLst>
+              <a:ext uri="{FF2B5EF4-FFF2-40B4-BE49-F238E27FC236}">
+                <a16:creationId xmlns:a16="http://schemas.microsoft.com/office/drawing/2014/main" id="{B03184C8-2187-492C-9088-7C9CBAD7B209}"/>
+              </a:ext>
+            </a:extLst>
+          </p:cNvPr>
+          <p:cNvSpPr txBox="1"/>
+          <p:nvPr/>
+        </p:nvSpPr>
+        <p:spPr>
+          <a:xfrm rot="16200000">
+            <a:off x="477889" y="2841468"/>
+            <a:ext cx="1131127" cy="338554"/>
+          </a:xfrm>
+          <a:prstGeom prst="rect">
+            <a:avLst/>
+          </a:prstGeom>
+          <a:noFill/>
+        </p:spPr>
+        <p:txBody>
+          <a:bodyPr wrap="square" rtlCol="0">
+            <a:spAutoFit/>
+          </a:bodyPr>
+          <a:lstStyle/>
+          <a:p>
+            <a:pPr algn="r"/>
+            <a:r>
+              <a:rPr lang="en-GB" sz="800" dirty="0">
+                <a:solidFill>
+                  <a:srgbClr val="00B0F0"/>
+                </a:solidFill>
+              </a:rPr>
+              <a:t>1200 – 0000 UTC</a:t>
+            </a:r>
+          </a:p>
+          <a:p>
+            <a:pPr algn="r"/>
+            <a:r>
+              <a:rPr lang="en-GB" sz="800" dirty="0">
+                <a:solidFill>
+                  <a:srgbClr val="00B0F0"/>
+                </a:solidFill>
+              </a:rPr>
+              <a:t>(0600 – 1800 LT)</a:t>
+            </a:r>
+          </a:p>
+        </p:txBody>
+      </p:sp>
+      <p:sp>
+        <p:nvSpPr>
+          <p:cNvPr id="54" name="TextBox 53">
+            <a:extLst>
+              <a:ext uri="{FF2B5EF4-FFF2-40B4-BE49-F238E27FC236}">
+                <a16:creationId xmlns:a16="http://schemas.microsoft.com/office/drawing/2014/main" id="{2F6E0737-39D9-44FB-A2B9-53790B9E95F5}"/>
+              </a:ext>
+            </a:extLst>
+          </p:cNvPr>
+          <p:cNvSpPr txBox="1"/>
+          <p:nvPr/>
+        </p:nvSpPr>
+        <p:spPr>
+          <a:xfrm rot="16200000">
+            <a:off x="810776" y="2841468"/>
+            <a:ext cx="1131127" cy="338554"/>
+          </a:xfrm>
+          <a:prstGeom prst="rect">
+            <a:avLst/>
+          </a:prstGeom>
+          <a:noFill/>
+        </p:spPr>
+        <p:txBody>
+          <a:bodyPr wrap="square" rtlCol="0">
+            <a:spAutoFit/>
+          </a:bodyPr>
+          <a:lstStyle/>
+          <a:p>
+            <a:pPr algn="r"/>
+            <a:r>
+              <a:rPr lang="en-GB" sz="800" dirty="0">
+                <a:solidFill>
+                  <a:srgbClr val="FF007F"/>
+                </a:solidFill>
+              </a:rPr>
+              <a:t>1800 – 0600 UTC</a:t>
+            </a:r>
+          </a:p>
+          <a:p>
+            <a:pPr algn="r"/>
+            <a:r>
+              <a:rPr lang="en-GB" sz="800" dirty="0">
+                <a:solidFill>
+                  <a:srgbClr val="FF007F"/>
+                </a:solidFill>
+              </a:rPr>
+              <a:t>(1200 – 0000 LT)</a:t>
+            </a:r>
+          </a:p>
+        </p:txBody>
+      </p:sp>
+      <p:sp>
+        <p:nvSpPr>
+          <p:cNvPr id="55" name="TextBox 54">
+            <a:extLst>
+              <a:ext uri="{FF2B5EF4-FFF2-40B4-BE49-F238E27FC236}">
+                <a16:creationId xmlns:a16="http://schemas.microsoft.com/office/drawing/2014/main" id="{F0A4CE5F-E598-4890-838D-B532B0830D09}"/>
+              </a:ext>
+            </a:extLst>
+          </p:cNvPr>
+          <p:cNvSpPr txBox="1"/>
+          <p:nvPr/>
+        </p:nvSpPr>
+        <p:spPr>
+          <a:xfrm rot="16200000">
+            <a:off x="1143663" y="2841468"/>
+            <a:ext cx="1131127" cy="338554"/>
+          </a:xfrm>
+          <a:prstGeom prst="rect">
+            <a:avLst/>
+          </a:prstGeom>
+          <a:noFill/>
+        </p:spPr>
+        <p:txBody>
+          <a:bodyPr wrap="square" rtlCol="0">
+            <a:spAutoFit/>
+          </a:bodyPr>
+          <a:lstStyle/>
           <a:p>
             <a:pPr algn="r"/>
             <a:r>
@@ -4582,7 +4832,258 @@
                   <a:srgbClr val="00B050"/>
                 </a:solidFill>
               </a:rPr>
-              <a:t>(1800 – 0600 LST)</a:t>
+              <a:t>0000 – 1200 UTC</a:t>
+            </a:r>
+          </a:p>
+          <a:p>
+            <a:pPr algn="r"/>
+            <a:r>
+              <a:rPr lang="en-GB" sz="800" dirty="0">
+                <a:solidFill>
+                  <a:srgbClr val="00B050"/>
+                </a:solidFill>
+              </a:rPr>
+              <a:t>(1800 – 0600 LT)</a:t>
+            </a:r>
+          </a:p>
+        </p:txBody>
+      </p:sp>
+      <p:sp>
+        <p:nvSpPr>
+          <p:cNvPr id="56" name="TextBox 55">
+            <a:extLst>
+              <a:ext uri="{FF2B5EF4-FFF2-40B4-BE49-F238E27FC236}">
+                <a16:creationId xmlns:a16="http://schemas.microsoft.com/office/drawing/2014/main" id="{7FEFF7F7-0470-48CB-8BA3-3C8C727104B4}"/>
+              </a:ext>
+            </a:extLst>
+          </p:cNvPr>
+          <p:cNvSpPr txBox="1"/>
+          <p:nvPr/>
+        </p:nvSpPr>
+        <p:spPr>
+          <a:xfrm rot="16200000">
+            <a:off x="1476550" y="2841468"/>
+            <a:ext cx="1131127" cy="338554"/>
+          </a:xfrm>
+          <a:prstGeom prst="rect">
+            <a:avLst/>
+          </a:prstGeom>
+          <a:noFill/>
+        </p:spPr>
+        <p:txBody>
+          <a:bodyPr wrap="square" rtlCol="0">
+            <a:spAutoFit/>
+          </a:bodyPr>
+          <a:lstStyle/>
+          <a:p>
+            <a:pPr algn="r"/>
+            <a:r>
+              <a:rPr lang="en-GB" sz="800" dirty="0">
+                <a:solidFill>
+                  <a:srgbClr val="7030A0"/>
+                </a:solidFill>
+              </a:rPr>
+              <a:t>0600 – 1800 UTC</a:t>
+            </a:r>
+          </a:p>
+          <a:p>
+            <a:pPr algn="r"/>
+            <a:r>
+              <a:rPr lang="en-GB" sz="800" dirty="0">
+                <a:solidFill>
+                  <a:srgbClr val="7030A0"/>
+                </a:solidFill>
+              </a:rPr>
+              <a:t>(0000 – 1200 LT)</a:t>
+            </a:r>
+          </a:p>
+        </p:txBody>
+      </p:sp>
+      <p:sp>
+        <p:nvSpPr>
+          <p:cNvPr id="57" name="TextBox 56">
+            <a:extLst>
+              <a:ext uri="{FF2B5EF4-FFF2-40B4-BE49-F238E27FC236}">
+                <a16:creationId xmlns:a16="http://schemas.microsoft.com/office/drawing/2014/main" id="{52273D43-CB38-4946-B5AF-03FF216B5D15}"/>
+              </a:ext>
+            </a:extLst>
+          </p:cNvPr>
+          <p:cNvSpPr txBox="1"/>
+          <p:nvPr/>
+        </p:nvSpPr>
+        <p:spPr>
+          <a:xfrm rot="16200000">
+            <a:off x="1809437" y="2841468"/>
+            <a:ext cx="1131127" cy="338554"/>
+          </a:xfrm>
+          <a:prstGeom prst="rect">
+            <a:avLst/>
+          </a:prstGeom>
+          <a:noFill/>
+        </p:spPr>
+        <p:txBody>
+          <a:bodyPr wrap="square" rtlCol="0">
+            <a:spAutoFit/>
+          </a:bodyPr>
+          <a:lstStyle/>
+          <a:p>
+            <a:pPr algn="r"/>
+            <a:r>
+              <a:rPr lang="en-GB" sz="800" dirty="0">
+                <a:solidFill>
+                  <a:srgbClr val="00B0F0"/>
+                </a:solidFill>
+              </a:rPr>
+              <a:t>1200 – 0000 UTC</a:t>
+            </a:r>
+          </a:p>
+          <a:p>
+            <a:pPr algn="r"/>
+            <a:r>
+              <a:rPr lang="en-GB" sz="800" dirty="0">
+                <a:solidFill>
+                  <a:srgbClr val="00B0F0"/>
+                </a:solidFill>
+              </a:rPr>
+              <a:t>(0600 – 1800 LT)</a:t>
+            </a:r>
+          </a:p>
+        </p:txBody>
+      </p:sp>
+      <p:sp>
+        <p:nvSpPr>
+          <p:cNvPr id="59" name="TextBox 58">
+            <a:extLst>
+              <a:ext uri="{FF2B5EF4-FFF2-40B4-BE49-F238E27FC236}">
+                <a16:creationId xmlns:a16="http://schemas.microsoft.com/office/drawing/2014/main" id="{6E7CA76B-FCAC-4791-B12D-C269E8A017ED}"/>
+              </a:ext>
+            </a:extLst>
+          </p:cNvPr>
+          <p:cNvSpPr txBox="1"/>
+          <p:nvPr/>
+        </p:nvSpPr>
+        <p:spPr>
+          <a:xfrm rot="16200000">
+            <a:off x="2142324" y="2841468"/>
+            <a:ext cx="1131127" cy="338554"/>
+          </a:xfrm>
+          <a:prstGeom prst="rect">
+            <a:avLst/>
+          </a:prstGeom>
+          <a:noFill/>
+        </p:spPr>
+        <p:txBody>
+          <a:bodyPr wrap="square" rtlCol="0">
+            <a:spAutoFit/>
+          </a:bodyPr>
+          <a:lstStyle/>
+          <a:p>
+            <a:pPr algn="r"/>
+            <a:r>
+              <a:rPr lang="en-GB" sz="800" dirty="0">
+                <a:solidFill>
+                  <a:srgbClr val="FF007F"/>
+                </a:solidFill>
+              </a:rPr>
+              <a:t>1800 – 0600 UTC</a:t>
+            </a:r>
+          </a:p>
+          <a:p>
+            <a:pPr algn="r"/>
+            <a:r>
+              <a:rPr lang="en-GB" sz="800" dirty="0">
+                <a:solidFill>
+                  <a:srgbClr val="FF007F"/>
+                </a:solidFill>
+              </a:rPr>
+              <a:t>(1200 – 0000 LT)</a:t>
+            </a:r>
+          </a:p>
+        </p:txBody>
+      </p:sp>
+      <p:sp>
+        <p:nvSpPr>
+          <p:cNvPr id="60" name="TextBox 59">
+            <a:extLst>
+              <a:ext uri="{FF2B5EF4-FFF2-40B4-BE49-F238E27FC236}">
+                <a16:creationId xmlns:a16="http://schemas.microsoft.com/office/drawing/2014/main" id="{6FE3D72B-2B6D-448F-A637-49C0113C9172}"/>
+              </a:ext>
+            </a:extLst>
+          </p:cNvPr>
+          <p:cNvSpPr txBox="1"/>
+          <p:nvPr/>
+        </p:nvSpPr>
+        <p:spPr>
+          <a:xfrm rot="16200000">
+            <a:off x="2475213" y="2841468"/>
+            <a:ext cx="1131127" cy="338554"/>
+          </a:xfrm>
+          <a:prstGeom prst="rect">
+            <a:avLst/>
+          </a:prstGeom>
+          <a:noFill/>
+        </p:spPr>
+        <p:txBody>
+          <a:bodyPr wrap="square" rtlCol="0">
+            <a:spAutoFit/>
+          </a:bodyPr>
+          <a:lstStyle/>
+          <a:p>
+            <a:pPr algn="r"/>
+            <a:r>
+              <a:rPr lang="en-GB" sz="800" dirty="0">
+                <a:solidFill>
+                  <a:srgbClr val="00B050"/>
+                </a:solidFill>
+              </a:rPr>
+              <a:t>0000 – 1200 UTC</a:t>
+            </a:r>
+          </a:p>
+          <a:p>
+            <a:pPr algn="r"/>
+            <a:r>
+              <a:rPr lang="en-GB" sz="800" dirty="0">
+                <a:solidFill>
+                  <a:srgbClr val="00B050"/>
+                </a:solidFill>
+              </a:rPr>
+              <a:t>(1800 – 0600 LT)</a:t>
+            </a:r>
+          </a:p>
+        </p:txBody>
+      </p:sp>
+      <p:sp>
+        <p:nvSpPr>
+          <p:cNvPr id="23" name="TextBox 22">
+            <a:extLst>
+              <a:ext uri="{FF2B5EF4-FFF2-40B4-BE49-F238E27FC236}">
+                <a16:creationId xmlns:a16="http://schemas.microsoft.com/office/drawing/2014/main" id="{96B9585E-AD8F-428C-9A04-EF5F51525FD7}"/>
+              </a:ext>
+            </a:extLst>
+          </p:cNvPr>
+          <p:cNvSpPr txBox="1"/>
+          <p:nvPr/>
+        </p:nvSpPr>
+        <p:spPr>
+          <a:xfrm>
+            <a:off x="377681" y="3296184"/>
+            <a:ext cx="2661715" cy="215444"/>
+          </a:xfrm>
+          <a:prstGeom prst="rect">
+            <a:avLst/>
+          </a:prstGeom>
+          <a:noFill/>
+        </p:spPr>
+        <p:txBody>
+          <a:bodyPr wrap="square" rtlCol="0">
+            <a:spAutoFit/>
+          </a:bodyPr>
+          <a:lstStyle/>
+          <a:p>
+            <a:pPr algn="ctr"/>
+            <a:r>
+              <a:rPr lang="en-GB" sz="800" dirty="0"/>
+              <a:t>12-hourly accumulation periods (in UTC and LT time)</a:t>
             </a:r>
           </a:p>
         </p:txBody>

</xml_diff>